<commit_message>
module ppt was updated
</commit_message>
<xml_diff>
--- a/AD9912_MODULE.pptx
+++ b/AD9912_MODULE.pptx
@@ -12326,7 +12326,7 @@
           <a:lstStyle/>
           <a:p>
             <a:r>
-              <a:rPr lang="en-US" altLang="ko-KR" dirty="0" smtClean="0"/>
+              <a:rPr lang="en-US" altLang="ko-KR" dirty="0"/>
               <a:t>New Design</a:t>
             </a:r>
             <a:endParaRPr lang="ko-KR" altLang="en-US" dirty="0"/>
@@ -14121,11 +14121,7 @@
               <a:pPr algn="ctr"/>
               <a:r>
                 <a:rPr lang="en-US" altLang="ko-KR" sz="900" dirty="0"/>
-                <a:t>DDS1_</a:t>
-              </a:r>
-              <a:r>
-                <a:rPr lang="en-US" altLang="ko-KR" sz="900" dirty="0" smtClean="0"/>
-                <a:t>profile0</a:t>
+                <a:t>DDS1_profile0</a:t>
               </a:r>
               <a:endParaRPr lang="ko-KR" altLang="en-US" sz="900" dirty="0"/>
             </a:p>
@@ -14244,7 +14240,7 @@
             <a:p>
               <a:pPr algn="ctr"/>
               <a:r>
-                <a:rPr lang="en-US" altLang="ko-KR" sz="900" dirty="0" smtClean="0"/>
+                <a:rPr lang="en-US" altLang="ko-KR" sz="900" dirty="0"/>
                 <a:t>DDS1_ioupdate</a:t>
               </a:r>
               <a:endParaRPr lang="ko-KR" altLang="en-US" sz="900" dirty="0"/>
@@ -14622,7 +14618,7 @@
           <a:p>
             <a:pPr algn="ctr"/>
             <a:r>
-              <a:rPr lang="en-US" altLang="ko-KR" sz="900" dirty="0" smtClean="0"/>
+              <a:rPr lang="en-US" altLang="ko-KR" sz="900" dirty="0"/>
               <a:t>jb_7</a:t>
             </a:r>
             <a:endParaRPr lang="ko-KR" altLang="en-US" sz="900" dirty="0"/>
@@ -14682,7 +14678,7 @@
           <a:p>
             <a:pPr algn="ctr"/>
             <a:r>
-              <a:rPr lang="en-US" altLang="ko-KR" sz="900" dirty="0" smtClean="0"/>
+              <a:rPr lang="en-US" altLang="ko-KR" sz="900" dirty="0"/>
               <a:t>jb_5</a:t>
             </a:r>
             <a:endParaRPr lang="ko-KR" altLang="en-US" sz="900" dirty="0"/>
@@ -14742,7 +14738,7 @@
           <a:p>
             <a:pPr algn="ctr"/>
             <a:r>
-              <a:rPr lang="en-US" altLang="ko-KR" sz="900" dirty="0" smtClean="0"/>
+              <a:rPr lang="en-US" altLang="ko-KR" sz="900" dirty="0"/>
               <a:t>jb_2</a:t>
             </a:r>
             <a:endParaRPr lang="ko-KR" altLang="en-US" sz="900" dirty="0"/>
@@ -14802,7 +14798,7 @@
           <a:p>
             <a:pPr algn="ctr"/>
             <a:r>
-              <a:rPr lang="en-US" altLang="ko-KR" sz="900" dirty="0" smtClean="0"/>
+              <a:rPr lang="en-US" altLang="ko-KR" sz="900" dirty="0"/>
               <a:t>jb_0</a:t>
             </a:r>
             <a:endParaRPr lang="ko-KR" altLang="en-US" sz="900" dirty="0"/>
@@ -14863,7 +14859,7 @@
           <a:p>
             <a:pPr algn="ctr"/>
             <a:r>
-              <a:rPr lang="en-US" altLang="ko-KR" sz="900" dirty="0" smtClean="0"/>
+              <a:rPr lang="en-US" altLang="ko-KR" sz="900" dirty="0"/>
               <a:t>jb_6</a:t>
             </a:r>
             <a:endParaRPr lang="ko-KR" altLang="en-US" sz="900" dirty="0"/>
@@ -14913,7 +14909,7 @@
           <a:p>
             <a:pPr algn="ctr"/>
             <a:r>
-              <a:rPr lang="en-US" altLang="ko-KR" sz="900" dirty="0" smtClean="0"/>
+              <a:rPr lang="en-US" altLang="ko-KR" sz="900" dirty="0"/>
               <a:t>rsdio_2</a:t>
             </a:r>
             <a:endParaRPr lang="ko-KR" altLang="en-US" sz="900" dirty="0"/>
@@ -14983,7 +14979,7 @@
             <a:p>
               <a:pPr algn="ctr"/>
               <a:r>
-                <a:rPr lang="en-US" altLang="ko-KR" sz="900" dirty="0" smtClean="0"/>
+                <a:rPr lang="en-US" altLang="ko-KR" sz="900" dirty="0"/>
                 <a:t>DDS2_profile0</a:t>
               </a:r>
               <a:endParaRPr lang="ko-KR" altLang="en-US" sz="900" dirty="0"/>
@@ -15103,7 +15099,7 @@
             <a:p>
               <a:pPr algn="ctr"/>
               <a:r>
-                <a:rPr lang="en-US" altLang="ko-KR" sz="900" dirty="0" smtClean="0"/>
+                <a:rPr lang="en-US" altLang="ko-KR" sz="900" dirty="0"/>
                 <a:t>DDS2_ioupdate</a:t>
               </a:r>
               <a:endParaRPr lang="ko-KR" altLang="en-US" sz="900" dirty="0"/>
@@ -15612,11 +15608,7 @@
               <a:pPr algn="ctr"/>
               <a:r>
                 <a:rPr lang="en-US" altLang="ko-KR" sz="900" dirty="0"/>
-                <a:t>DDS1_</a:t>
-              </a:r>
-              <a:r>
-                <a:rPr lang="en-US" altLang="ko-KR" sz="900" dirty="0" smtClean="0"/>
-                <a:t>profile1</a:t>
+                <a:t>DDS1_profile1</a:t>
               </a:r>
               <a:endParaRPr lang="ko-KR" altLang="en-US" sz="900" dirty="0"/>
             </a:p>
@@ -15735,7 +15727,7 @@
             <a:p>
               <a:pPr algn="ctr"/>
               <a:r>
-                <a:rPr lang="en-US" altLang="ko-KR" sz="900" dirty="0" smtClean="0"/>
+                <a:rPr lang="en-US" altLang="ko-KR" sz="900" dirty="0"/>
                 <a:t>DDS2_profile2</a:t>
               </a:r>
               <a:endParaRPr lang="ko-KR" altLang="en-US" sz="900" dirty="0"/>
@@ -15855,7 +15847,7 @@
             <a:p>
               <a:pPr algn="ctr"/>
               <a:r>
-                <a:rPr lang="en-US" altLang="ko-KR" sz="900" dirty="0" smtClean="0"/>
+                <a:rPr lang="en-US" altLang="ko-KR" sz="900" dirty="0"/>
                 <a:t>DDS2_profile1</a:t>
               </a:r>
               <a:endParaRPr lang="ko-KR" altLang="en-US" sz="900" dirty="0"/>
@@ -16010,7 +16002,7 @@
           <a:p>
             <a:pPr algn="ctr"/>
             <a:r>
-              <a:rPr lang="en-US" altLang="ko-KR" sz="900" dirty="0" smtClean="0"/>
+              <a:rPr lang="en-US" altLang="ko-KR" sz="900" dirty="0"/>
               <a:t>ja_1</a:t>
             </a:r>
             <a:endParaRPr lang="ko-KR" altLang="en-US" sz="900" dirty="0"/>
@@ -16070,7 +16062,7 @@
           <a:p>
             <a:pPr algn="ctr"/>
             <a:r>
-              <a:rPr lang="en-US" altLang="ko-KR" sz="900" dirty="0" smtClean="0"/>
+              <a:rPr lang="en-US" altLang="ko-KR" sz="900" dirty="0"/>
               <a:t>jb_1</a:t>
             </a:r>
             <a:endParaRPr lang="ko-KR" altLang="en-US" sz="900" dirty="0"/>
@@ -16132,7 +16124,7 @@
           <a:p>
             <a:pPr algn="ctr"/>
             <a:r>
-              <a:rPr lang="en-US" altLang="ko-KR" sz="900" dirty="0" smtClean="0"/>
+              <a:rPr lang="en-US" altLang="ko-KR" sz="900" dirty="0"/>
               <a:t>ja_4</a:t>
             </a:r>
             <a:endParaRPr lang="ko-KR" altLang="en-US" sz="900" dirty="0"/>
@@ -16316,7 +16308,7 @@
           <a:p>
             <a:pPr algn="ctr"/>
             <a:r>
-              <a:rPr lang="en-US" altLang="ko-KR" sz="900" dirty="0" smtClean="0"/>
+              <a:rPr lang="en-US" altLang="ko-KR" sz="900" dirty="0"/>
               <a:t>jc_7</a:t>
             </a:r>
             <a:endParaRPr lang="ko-KR" altLang="en-US" sz="900" dirty="0"/>
@@ -16376,7 +16368,7 @@
           <a:p>
             <a:pPr algn="ctr"/>
             <a:r>
-              <a:rPr lang="en-US" altLang="ko-KR" sz="900" dirty="0" smtClean="0"/>
+              <a:rPr lang="en-US" altLang="ko-KR" sz="900" dirty="0"/>
               <a:t>jc_6</a:t>
             </a:r>
             <a:endParaRPr lang="ko-KR" altLang="en-US" sz="900" dirty="0"/>
@@ -16436,7 +16428,7 @@
           <a:p>
             <a:pPr algn="ctr"/>
             <a:r>
-              <a:rPr lang="en-US" altLang="ko-KR" sz="900" dirty="0" smtClean="0"/>
+              <a:rPr lang="en-US" altLang="ko-KR" sz="900" dirty="0"/>
               <a:t>jc_5</a:t>
             </a:r>
             <a:endParaRPr lang="ko-KR" altLang="en-US" sz="900" dirty="0"/>
@@ -16496,7 +16488,7 @@
           <a:p>
             <a:pPr algn="ctr"/>
             <a:r>
-              <a:rPr lang="en-US" altLang="ko-KR" sz="900" dirty="0" smtClean="0"/>
+              <a:rPr lang="en-US" altLang="ko-KR" sz="900" dirty="0"/>
               <a:t>jc_4</a:t>
             </a:r>
             <a:endParaRPr lang="ko-KR" altLang="en-US" sz="900" dirty="0"/>
@@ -16556,7 +16548,7 @@
           <a:p>
             <a:pPr algn="ctr"/>
             <a:r>
-              <a:rPr lang="en-US" altLang="ko-KR" sz="900" dirty="0" smtClean="0"/>
+              <a:rPr lang="en-US" altLang="ko-KR" sz="900" dirty="0"/>
               <a:t>jc_3</a:t>
             </a:r>
             <a:endParaRPr lang="ko-KR" altLang="en-US" sz="900" dirty="0"/>
@@ -16616,7 +16608,7 @@
           <a:p>
             <a:pPr algn="ctr"/>
             <a:r>
-              <a:rPr lang="en-US" altLang="ko-KR" sz="900" dirty="0" smtClean="0"/>
+              <a:rPr lang="en-US" altLang="ko-KR" sz="900" dirty="0"/>
               <a:t>jc_2</a:t>
             </a:r>
             <a:endParaRPr lang="ko-KR" altLang="en-US" sz="900" dirty="0"/>
@@ -16676,7 +16668,7 @@
           <a:p>
             <a:pPr algn="ctr"/>
             <a:r>
-              <a:rPr lang="en-US" altLang="ko-KR" sz="900" dirty="0" smtClean="0"/>
+              <a:rPr lang="en-US" altLang="ko-KR" sz="900" dirty="0"/>
               <a:t>jc_1</a:t>
             </a:r>
             <a:endParaRPr lang="ko-KR" altLang="en-US" sz="900" dirty="0"/>
@@ -16736,7 +16728,7 @@
           <a:p>
             <a:pPr algn="ctr"/>
             <a:r>
-              <a:rPr lang="en-US" altLang="ko-KR" sz="900" dirty="0" smtClean="0"/>
+              <a:rPr lang="en-US" altLang="ko-KR" sz="900" dirty="0"/>
               <a:t>jc_0</a:t>
             </a:r>
             <a:endParaRPr lang="ko-KR" altLang="en-US" sz="900" dirty="0"/>
@@ -16796,7 +16788,7 @@
           <a:p>
             <a:pPr algn="ctr"/>
             <a:r>
-              <a:rPr lang="en-US" altLang="ko-KR" sz="900" dirty="0" smtClean="0"/>
+              <a:rPr lang="en-US" altLang="ko-KR" sz="900" dirty="0"/>
               <a:t>jd_7</a:t>
             </a:r>
             <a:endParaRPr lang="ko-KR" altLang="en-US" sz="900" dirty="0"/>
@@ -16856,7 +16848,7 @@
           <a:p>
             <a:pPr algn="ctr"/>
             <a:r>
-              <a:rPr lang="en-US" altLang="ko-KR" sz="900" dirty="0" smtClean="0"/>
+              <a:rPr lang="en-US" altLang="ko-KR" sz="900" dirty="0"/>
               <a:t>jd_6</a:t>
             </a:r>
             <a:endParaRPr lang="ko-KR" altLang="en-US" sz="900" dirty="0"/>
@@ -16916,7 +16908,7 @@
           <a:p>
             <a:pPr algn="ctr"/>
             <a:r>
-              <a:rPr lang="en-US" altLang="ko-KR" sz="900" dirty="0" smtClean="0"/>
+              <a:rPr lang="en-US" altLang="ko-KR" sz="900" dirty="0"/>
               <a:t>jd_5</a:t>
             </a:r>
             <a:endParaRPr lang="ko-KR" altLang="en-US" sz="900" dirty="0"/>
@@ -16976,7 +16968,7 @@
           <a:p>
             <a:pPr algn="ctr"/>
             <a:r>
-              <a:rPr lang="en-US" altLang="ko-KR" sz="900" dirty="0" smtClean="0"/>
+              <a:rPr lang="en-US" altLang="ko-KR" sz="900" dirty="0"/>
               <a:t>jd_4</a:t>
             </a:r>
             <a:endParaRPr lang="ko-KR" altLang="en-US" sz="900" dirty="0"/>
@@ -17036,7 +17028,7 @@
           <a:p>
             <a:pPr algn="ctr"/>
             <a:r>
-              <a:rPr lang="en-US" altLang="ko-KR" sz="900" dirty="0" smtClean="0"/>
+              <a:rPr lang="en-US" altLang="ko-KR" sz="900" dirty="0"/>
               <a:t>jd_3</a:t>
             </a:r>
             <a:endParaRPr lang="ko-KR" altLang="en-US" sz="900" dirty="0"/>
@@ -17096,7 +17088,7 @@
           <a:p>
             <a:pPr algn="ctr"/>
             <a:r>
-              <a:rPr lang="en-US" altLang="ko-KR" sz="900" dirty="0" smtClean="0"/>
+              <a:rPr lang="en-US" altLang="ko-KR" sz="900" dirty="0"/>
               <a:t>jd_2</a:t>
             </a:r>
             <a:endParaRPr lang="ko-KR" altLang="en-US" sz="900" dirty="0"/>
@@ -17156,7 +17148,7 @@
           <a:p>
             <a:pPr algn="ctr"/>
             <a:r>
-              <a:rPr lang="en-US" altLang="ko-KR" sz="900" dirty="0" smtClean="0"/>
+              <a:rPr lang="en-US" altLang="ko-KR" sz="900" dirty="0"/>
               <a:t>jd_1</a:t>
             </a:r>
             <a:endParaRPr lang="ko-KR" altLang="en-US" sz="900" dirty="0"/>
@@ -17216,7 +17208,7 @@
           <a:p>
             <a:pPr algn="ctr"/>
             <a:r>
-              <a:rPr lang="en-US" altLang="ko-KR" sz="900" dirty="0" smtClean="0"/>
+              <a:rPr lang="en-US" altLang="ko-KR" sz="900" dirty="0"/>
               <a:t>jd_0</a:t>
             </a:r>
             <a:endParaRPr lang="ko-KR" altLang="en-US" sz="900" dirty="0"/>
@@ -17289,7 +17281,7 @@
             <a:p>
               <a:pPr algn="ctr"/>
               <a:r>
-                <a:rPr lang="en-US" altLang="ko-KR" sz="900" dirty="0" smtClean="0">
+                <a:rPr lang="en-US" altLang="ko-KR" sz="900" dirty="0">
                   <a:solidFill>
                     <a:schemeClr val="tx1"/>
                   </a:solidFill>
@@ -17346,7 +17338,15 @@
             <a:lstStyle/>
             <a:p>
               <a:r>
-                <a:rPr lang="en-US" altLang="ko-KR" sz="900" dirty="0" err="1" smtClean="0">
+                <a:rPr lang="en-US" altLang="ko-KR" sz="900" dirty="0">
+                  <a:solidFill>
+                    <a:schemeClr val="tx1"/>
+                  </a:solidFill>
+                </a:rPr>
+                <a:t>[64+18 - 1:0]</a:t>
+              </a:r>
+              <a:r>
+                <a:rPr lang="en-US" altLang="ko-KR" sz="900" dirty="0" err="1">
                   <a:solidFill>
                     <a:schemeClr val="tx1"/>
                   </a:solidFill>
@@ -17468,7 +17468,7 @@
             <a:lstStyle/>
             <a:p>
               <a:r>
-                <a:rPr lang="en-US" altLang="ko-KR" sz="900" dirty="0" smtClean="0">
+                <a:rPr lang="en-US" altLang="ko-KR" sz="900" dirty="0">
                   <a:solidFill>
                     <a:schemeClr val="tx1"/>
                   </a:solidFill>
@@ -17529,7 +17529,7 @@
             <a:lstStyle/>
             <a:p>
               <a:r>
-                <a:rPr lang="en-US" altLang="ko-KR" sz="900" dirty="0" smtClean="0">
+                <a:rPr lang="en-US" altLang="ko-KR" sz="900" dirty="0">
                   <a:solidFill>
                     <a:schemeClr val="tx1"/>
                   </a:solidFill>
@@ -17590,7 +17590,7 @@
             <a:lstStyle/>
             <a:p>
               <a:r>
-                <a:rPr lang="en-US" altLang="ko-KR" sz="900" dirty="0" smtClean="0">
+                <a:rPr lang="en-US" altLang="ko-KR" sz="900" dirty="0">
                   <a:solidFill>
                     <a:schemeClr val="tx1"/>
                   </a:solidFill>
@@ -17651,7 +17651,7 @@
             <a:lstStyle/>
             <a:p>
               <a:r>
-                <a:rPr lang="en-US" altLang="ko-KR" sz="900" dirty="0" smtClean="0">
+                <a:rPr lang="en-US" altLang="ko-KR" sz="900" dirty="0">
                   <a:solidFill>
                     <a:schemeClr val="tx1"/>
                   </a:solidFill>
@@ -17712,73 +17712,20 @@
             <a:lstStyle/>
             <a:p>
               <a:r>
-                <a:rPr lang="en-US" altLang="ko-KR" sz="900" dirty="0" err="1" smtClean="0">
+                <a:rPr lang="en-US" altLang="ko-KR" sz="900" dirty="0">
+                  <a:solidFill>
+                    <a:schemeClr val="tx1"/>
+                  </a:solidFill>
+                </a:rPr>
+                <a:t>[64+18 - 1:0]</a:t>
+              </a:r>
+              <a:r>
+                <a:rPr lang="en-US" altLang="ko-KR" sz="900" dirty="0" err="1">
                   <a:solidFill>
                     <a:schemeClr val="tx1"/>
                   </a:solidFill>
                 </a:rPr>
                 <a:t>data_in</a:t>
-              </a:r>
-              <a:endParaRPr lang="ko-KR" altLang="en-US" sz="900" dirty="0">
-                <a:solidFill>
-                  <a:schemeClr val="tx1"/>
-                </a:solidFill>
-              </a:endParaRPr>
-            </a:p>
-          </p:txBody>
-        </p:sp>
-        <p:sp>
-          <p:nvSpPr>
-            <p:cNvPr id="103" name="직사각형 102">
-              <a:extLst>
-                <a:ext uri="{FF2B5EF4-FFF2-40B4-BE49-F238E27FC236}">
-                  <a16:creationId xmlns:a16="http://schemas.microsoft.com/office/drawing/2014/main" id="{2436FF16-F5E5-4FCF-962E-F7680271B5EF}"/>
-                </a:ext>
-              </a:extLst>
-            </p:cNvPr>
-            <p:cNvSpPr/>
-            <p:nvPr/>
-          </p:nvSpPr>
-          <p:spPr>
-            <a:xfrm>
-              <a:off x="2800341" y="2639688"/>
-              <a:ext cx="1466859" cy="230512"/>
-            </a:xfrm>
-            <a:prstGeom prst="rect">
-              <a:avLst/>
-            </a:prstGeom>
-            <a:noFill/>
-            <a:ln>
-              <a:noFill/>
-            </a:ln>
-          </p:spPr>
-          <p:style>
-            <a:lnRef idx="2">
-              <a:schemeClr val="accent1">
-                <a:shade val="50000"/>
-              </a:schemeClr>
-            </a:lnRef>
-            <a:fillRef idx="1">
-              <a:schemeClr val="accent1"/>
-            </a:fillRef>
-            <a:effectRef idx="0">
-              <a:schemeClr val="accent1"/>
-            </a:effectRef>
-            <a:fontRef idx="minor">
-              <a:schemeClr val="lt1"/>
-            </a:fontRef>
-          </p:style>
-          <p:txBody>
-            <a:bodyPr rtlCol="0" anchor="ctr"/>
-            <a:lstStyle/>
-            <a:p>
-              <a:r>
-                <a:rPr lang="en-US" altLang="ko-KR" sz="900" dirty="0" smtClean="0">
-                  <a:solidFill>
-                    <a:schemeClr val="tx1"/>
-                  </a:solidFill>
-                </a:rPr>
-                <a:t>timestamp</a:t>
               </a:r>
               <a:endParaRPr lang="ko-KR" altLang="en-US" sz="900" dirty="0">
                 <a:solidFill>
@@ -17834,7 +17781,7 @@
             <a:lstStyle/>
             <a:p>
               <a:r>
-                <a:rPr lang="en-US" altLang="ko-KR" sz="900" dirty="0" smtClean="0">
+                <a:rPr lang="en-US" altLang="ko-KR" sz="900" dirty="0">
                   <a:solidFill>
                     <a:schemeClr val="tx1"/>
                   </a:solidFill>
@@ -17913,7 +17860,7 @@
             <a:p>
               <a:pPr algn="ctr"/>
               <a:r>
-                <a:rPr lang="en-US" altLang="ko-KR" sz="900" dirty="0" smtClean="0"/>
+                <a:rPr lang="en-US" altLang="ko-KR" sz="900" dirty="0"/>
                 <a:t>[17:0]out_buffer1</a:t>
               </a:r>
               <a:endParaRPr lang="ko-KR" altLang="en-US" sz="900" dirty="0"/>
@@ -18046,7 +17993,7 @@
         </p:nvSpPr>
         <p:spPr>
           <a:xfrm>
-            <a:off x="3927653" y="649354"/>
+            <a:off x="2766851" y="649354"/>
             <a:ext cx="1466859" cy="230512"/>
           </a:xfrm>
           <a:prstGeom prst="rect">
@@ -18100,7 +18047,7 @@
         <p:spPr>
           <a:xfrm>
             <a:off x="2016121" y="764101"/>
-            <a:ext cx="1911532" cy="509"/>
+            <a:ext cx="750730" cy="509"/>
           </a:xfrm>
           <a:prstGeom prst="bentConnector3">
             <a:avLst>
@@ -18190,11 +18137,7 @@
               <a:pPr algn="ctr"/>
               <a:r>
                 <a:rPr lang="en-US" altLang="ko-KR" sz="900" dirty="0"/>
-                <a:t>[17:0]</a:t>
-              </a:r>
-              <a:r>
-                <a:rPr lang="en-US" altLang="ko-KR" sz="900" dirty="0" smtClean="0"/>
-                <a:t>out_buffer2</a:t>
+                <a:t>[17:0]out_buffer2</a:t>
               </a:r>
               <a:endParaRPr lang="ko-KR" altLang="en-US" sz="900" dirty="0"/>
             </a:p>
@@ -18260,13 +18203,13 @@
           <p:nvPr/>
         </p:nvCxnSpPr>
         <p:spPr>
-          <a:xfrm flipH="1">
-            <a:off x="4242517" y="764610"/>
-            <a:ext cx="1151995" cy="2388544"/>
+          <a:xfrm>
+            <a:off x="4233710" y="764610"/>
+            <a:ext cx="8807" cy="2388544"/>
           </a:xfrm>
           <a:prstGeom prst="bentConnector3">
             <a:avLst>
-              <a:gd name="adj1" fmla="val -19844"/>
+              <a:gd name="adj1" fmla="val 2670467"/>
             </a:avLst>
           </a:prstGeom>
           <a:ln>
@@ -18298,13 +18241,13 @@
           <p:nvPr/>
         </p:nvCxnSpPr>
         <p:spPr>
-          <a:xfrm flipH="1">
-            <a:off x="4239342" y="764610"/>
-            <a:ext cx="1155170" cy="1954832"/>
+          <a:xfrm>
+            <a:off x="4233710" y="764610"/>
+            <a:ext cx="5632" cy="1954832"/>
           </a:xfrm>
           <a:prstGeom prst="bentConnector3">
             <a:avLst>
-              <a:gd name="adj1" fmla="val -19789"/>
+              <a:gd name="adj1" fmla="val 4119549"/>
             </a:avLst>
           </a:prstGeom>
           <a:ln>
@@ -18340,7 +18283,7 @@
         </p:nvSpPr>
         <p:spPr>
           <a:xfrm>
-            <a:off x="6761416" y="2213931"/>
+            <a:off x="6959838" y="1087857"/>
             <a:ext cx="1082676" cy="228600"/>
           </a:xfrm>
           <a:prstGeom prst="homePlate">
@@ -18406,8 +18349,8 @@
         </p:nvCxnSpPr>
         <p:spPr>
           <a:xfrm>
-            <a:off x="7844092" y="2328231"/>
-            <a:ext cx="384183" cy="1263"/>
+            <a:off x="8042514" y="1202157"/>
+            <a:ext cx="185761" cy="1127337"/>
           </a:xfrm>
           <a:prstGeom prst="bentConnector3">
             <a:avLst>
@@ -18496,7 +18439,7 @@
             <a:p>
               <a:pPr algn="ctr"/>
               <a:r>
-                <a:rPr lang="en-US" altLang="ko-KR" sz="900" dirty="0" smtClean="0">
+                <a:rPr lang="en-US" altLang="ko-KR" sz="900" dirty="0">
                   <a:solidFill>
                     <a:schemeClr val="tx1"/>
                   </a:solidFill>
@@ -18553,7 +18496,7 @@
             <a:lstStyle/>
             <a:p>
               <a:r>
-                <a:rPr lang="en-US" altLang="ko-KR" sz="900" dirty="0" smtClean="0">
+                <a:rPr lang="en-US" altLang="ko-KR" sz="900" dirty="0">
                   <a:solidFill>
                     <a:schemeClr val="tx1"/>
                   </a:solidFill>
@@ -18614,7 +18557,7 @@
             <a:lstStyle/>
             <a:p>
               <a:r>
-                <a:rPr lang="en-US" altLang="ko-KR" sz="900" dirty="0" smtClean="0">
+                <a:rPr lang="en-US" altLang="ko-KR" sz="900" dirty="0">
                   <a:solidFill>
                     <a:schemeClr val="tx1"/>
                   </a:solidFill>
@@ -18648,8 +18591,8 @@
         </p:nvCxnSpPr>
         <p:spPr>
           <a:xfrm rot="10800000">
-            <a:off x="7534813" y="4143375"/>
-            <a:ext cx="693462" cy="1375082"/>
+            <a:off x="6754769" y="4143375"/>
+            <a:ext cx="1473507" cy="1375082"/>
           </a:xfrm>
           <a:prstGeom prst="bentConnector2">
             <a:avLst/>
@@ -18687,7 +18630,7 @@
         </p:nvSpPr>
         <p:spPr>
           <a:xfrm>
-            <a:off x="7436937" y="3947623"/>
+            <a:off x="6656892" y="3947623"/>
             <a:ext cx="195752" cy="195752"/>
           </a:xfrm>
           <a:prstGeom prst="ellipse">
@@ -18716,7 +18659,7 @@
           <a:p>
             <a:pPr algn="ctr"/>
             <a:r>
-              <a:rPr lang="en-US" altLang="ko-KR" sz="1100" dirty="0" smtClean="0"/>
+              <a:rPr lang="en-US" altLang="ko-KR" sz="1100" dirty="0"/>
               <a:t>=</a:t>
             </a:r>
             <a:endParaRPr lang="ko-KR" altLang="en-US" sz="1100" dirty="0"/>
@@ -18734,18 +18677,20 @@
           </p:cNvPr>
           <p:cNvCxnSpPr>
             <a:cxnSpLocks/>
-            <a:stCxn id="102" idx="0"/>
+            <a:stCxn id="102" idx="6"/>
             <a:endCxn id="235" idx="2"/>
           </p:cNvCxnSpPr>
           <p:nvPr/>
         </p:nvCxnSpPr>
         <p:spPr>
-          <a:xfrm rot="5400000" flipH="1" flipV="1">
-            <a:off x="6941352" y="3135092"/>
-            <a:ext cx="1405993" cy="219071"/>
-          </a:xfrm>
-          <a:prstGeom prst="bentConnector2">
-            <a:avLst/>
+          <a:xfrm flipV="1">
+            <a:off x="6852644" y="2541630"/>
+            <a:ext cx="901240" cy="1503869"/>
+          </a:xfrm>
+          <a:prstGeom prst="bentConnector3">
+            <a:avLst>
+              <a:gd name="adj1" fmla="val 50000"/>
+            </a:avLst>
           </a:prstGeom>
           <a:ln>
             <a:tailEnd type="triangle"/>
@@ -18777,20 +18722,18 @@
           </p:cNvPr>
           <p:cNvCxnSpPr>
             <a:cxnSpLocks/>
-            <a:stCxn id="103" idx="1"/>
-            <a:endCxn id="102" idx="6"/>
+            <a:stCxn id="54" idx="1"/>
+            <a:endCxn id="102" idx="0"/>
           </p:cNvCxnSpPr>
           <p:nvPr/>
         </p:nvCxnSpPr>
         <p:spPr>
           <a:xfrm rot="10800000" flipV="1">
-            <a:off x="7632689" y="4043993"/>
-            <a:ext cx="595586" cy="1505"/>
-          </a:xfrm>
-          <a:prstGeom prst="bentConnector3">
-            <a:avLst>
-              <a:gd name="adj1" fmla="val 50000"/>
-            </a:avLst>
+            <a:off x="6754769" y="2043743"/>
+            <a:ext cx="1473507" cy="1903879"/>
+          </a:xfrm>
+          <a:prstGeom prst="bentConnector2">
+            <a:avLst/>
           </a:prstGeom>
           <a:ln>
             <a:tailEnd type="triangle"/>
@@ -18864,7 +18807,7 @@
           <a:p>
             <a:pPr algn="ctr"/>
             <a:r>
-              <a:rPr lang="en-US" altLang="ko-KR" sz="900" dirty="0" smtClean="0"/>
+              <a:rPr lang="en-US" altLang="ko-KR" sz="900" dirty="0"/>
               <a:t>jb_4</a:t>
             </a:r>
             <a:endParaRPr lang="ko-KR" altLang="en-US" sz="900" dirty="0"/>
@@ -18924,7 +18867,7 @@
           <a:p>
             <a:pPr algn="ctr"/>
             <a:r>
-              <a:rPr lang="en-US" altLang="ko-KR" sz="900" dirty="0" smtClean="0"/>
+              <a:rPr lang="en-US" altLang="ko-KR" sz="900" dirty="0"/>
               <a:t>jb_3</a:t>
             </a:r>
             <a:endParaRPr lang="ko-KR" altLang="en-US" sz="900" dirty="0"/>
@@ -18977,7 +18920,7 @@
           <a:lstStyle/>
           <a:p>
             <a:r>
-              <a:rPr lang="en-US" altLang="ko-KR" sz="900" dirty="0" smtClean="0">
+              <a:rPr lang="en-US" altLang="ko-KR" sz="900" dirty="0">
                 <a:solidFill>
                   <a:schemeClr val="tx1"/>
                 </a:solidFill>
@@ -19038,7 +18981,7 @@
           <a:lstStyle/>
           <a:p>
             <a:r>
-              <a:rPr lang="en-US" altLang="ko-KR" sz="900" dirty="0" smtClean="0">
+              <a:rPr lang="en-US" altLang="ko-KR" sz="900" dirty="0">
                 <a:solidFill>
                   <a:schemeClr val="tx1"/>
                 </a:solidFill>
@@ -19099,7 +19042,7 @@
           <a:lstStyle/>
           <a:p>
             <a:r>
-              <a:rPr lang="en-US" altLang="ko-KR" sz="900" dirty="0" smtClean="0">
+              <a:rPr lang="en-US" altLang="ko-KR" sz="900" dirty="0">
                 <a:solidFill>
                   <a:schemeClr val="tx1"/>
                 </a:solidFill>
@@ -19116,20 +19059,12 @@
           </a:p>
           <a:p>
             <a:r>
-              <a:rPr lang="en-US" altLang="ko-KR" sz="900" dirty="0" smtClean="0">
+              <a:rPr lang="en-US" altLang="ko-KR" sz="900" dirty="0">
                 <a:solidFill>
                   <a:schemeClr val="tx1"/>
                 </a:solidFill>
               </a:rPr>
-              <a:t>[2] Output </a:t>
-            </a:r>
-            <a:r>
-              <a:rPr lang="en-US" altLang="ko-KR" sz="900" dirty="0" smtClean="0">
-                <a:solidFill>
-                  <a:schemeClr val="tx1"/>
-                </a:solidFill>
-              </a:rPr>
-              <a:t>Using command</a:t>
+              <a:t>[2] Output Using command</a:t>
             </a:r>
             <a:endParaRPr lang="ko-KR" altLang="en-US" sz="900" dirty="0">
               <a:solidFill>
@@ -19157,12 +19092,12 @@
         </p:nvCxnSpPr>
         <p:spPr>
           <a:xfrm rot="10800000" flipV="1">
-            <a:off x="4249335" y="4045499"/>
-            <a:ext cx="3187602" cy="514562"/>
+            <a:off x="4249336" y="4045499"/>
+            <a:ext cx="2407557" cy="420904"/>
           </a:xfrm>
           <a:prstGeom prst="bentConnector3">
             <a:avLst>
-              <a:gd name="adj1" fmla="val 6074"/>
+              <a:gd name="adj1" fmla="val 55011"/>
             </a:avLst>
           </a:prstGeom>
           <a:ln>
@@ -19192,7 +19127,7 @@
         </p:nvGrpSpPr>
         <p:grpSpPr>
           <a:xfrm>
-            <a:off x="3601793" y="4432429"/>
+            <a:off x="3601793" y="4338771"/>
             <a:ext cx="698500" cy="255263"/>
             <a:chOff x="3601793" y="3387725"/>
             <a:chExt cx="698500" cy="255263"/>
@@ -19237,7 +19172,7 @@
             <a:p>
               <a:pPr algn="ctr"/>
               <a:r>
-                <a:rPr lang="en-US" altLang="ko-KR" sz="900" dirty="0" smtClean="0"/>
+                <a:rPr lang="en-US" altLang="ko-KR" sz="900" dirty="0"/>
                 <a:t>0      1</a:t>
               </a:r>
               <a:endParaRPr lang="ko-KR" altLang="en-US" sz="900" dirty="0"/>
@@ -19400,7 +19335,7 @@
             <a:p>
               <a:pPr algn="ctr"/>
               <a:r>
-                <a:rPr lang="en-US" altLang="ko-KR" sz="900" dirty="0" smtClean="0"/>
+                <a:rPr lang="en-US" altLang="ko-KR" sz="900" dirty="0"/>
                 <a:t>select</a:t>
               </a:r>
               <a:endParaRPr lang="ko-KR" altLang="en-US" sz="900" dirty="0"/>
@@ -19475,8 +19410,8 @@
         </p:nvCxnSpPr>
         <p:spPr>
           <a:xfrm rot="5400000" flipH="1" flipV="1">
-            <a:off x="3835369" y="4312523"/>
-            <a:ext cx="235581" cy="4232"/>
+            <a:off x="3882198" y="4265694"/>
+            <a:ext cx="141923" cy="4232"/>
           </a:xfrm>
           <a:prstGeom prst="bentConnector3">
             <a:avLst>
@@ -19514,20 +19449,20 @@
           <p:cNvCxnSpPr>
             <a:cxnSpLocks/>
             <a:stCxn id="157" idx="0"/>
-            <a:endCxn id="151" idx="4"/>
+            <a:endCxn id="259" idx="4"/>
           </p:cNvCxnSpPr>
           <p:nvPr/>
         </p:nvCxnSpPr>
         <p:spPr>
           <a:xfrm rot="16200000" flipH="1" flipV="1">
-            <a:off x="3465669" y="4197518"/>
-            <a:ext cx="720789" cy="258423"/>
+            <a:off x="3103220" y="4160840"/>
+            <a:ext cx="1046560" cy="657551"/>
           </a:xfrm>
           <a:prstGeom prst="bentConnector5">
             <a:avLst>
-              <a:gd name="adj1" fmla="val -45811"/>
-              <a:gd name="adj2" fmla="val 372269"/>
-              <a:gd name="adj3" fmla="val 131715"/>
+              <a:gd name="adj1" fmla="val -31854"/>
+              <a:gd name="adj2" fmla="val 146305"/>
+              <a:gd name="adj3" fmla="val 107888"/>
             </a:avLst>
           </a:prstGeom>
           <a:ln>
@@ -19549,167 +19484,6 @@
           </a:fontRef>
         </p:style>
       </p:cxnSp>
-      <p:grpSp>
-        <p:nvGrpSpPr>
-          <p:cNvPr id="165" name="그룹 164"/>
-          <p:cNvGrpSpPr/>
-          <p:nvPr/>
-        </p:nvGrpSpPr>
-        <p:grpSpPr>
-          <a:xfrm rot="16200000">
-            <a:off x="5579536" y="2161858"/>
-            <a:ext cx="698500" cy="255263"/>
-            <a:chOff x="3601793" y="3387725"/>
-            <a:chExt cx="698500" cy="255263"/>
-          </a:xfrm>
-        </p:grpSpPr>
-        <p:sp>
-          <p:nvSpPr>
-            <p:cNvPr id="166" name="사다리꼴 165"/>
-            <p:cNvSpPr/>
-            <p:nvPr/>
-          </p:nvSpPr>
-          <p:spPr>
-            <a:xfrm>
-              <a:off x="3601793" y="3387725"/>
-              <a:ext cx="698500" cy="255263"/>
-            </a:xfrm>
-            <a:prstGeom prst="trapezoid">
-              <a:avLst>
-                <a:gd name="adj" fmla="val 39926"/>
-              </a:avLst>
-            </a:prstGeom>
-          </p:spPr>
-          <p:style>
-            <a:lnRef idx="2">
-              <a:schemeClr val="accent1">
-                <a:shade val="50000"/>
-              </a:schemeClr>
-            </a:lnRef>
-            <a:fillRef idx="1">
-              <a:schemeClr val="accent1"/>
-            </a:fillRef>
-            <a:effectRef idx="0">
-              <a:schemeClr val="accent1"/>
-            </a:effectRef>
-            <a:fontRef idx="minor">
-              <a:schemeClr val="lt1"/>
-            </a:fontRef>
-          </p:style>
-          <p:txBody>
-            <a:bodyPr rtlCol="0" anchor="ctr"/>
-            <a:lstStyle/>
-            <a:p>
-              <a:pPr algn="ctr"/>
-              <a:r>
-                <a:rPr lang="en-US" altLang="ko-KR" sz="900" dirty="0"/>
-                <a:t>1</a:t>
-              </a:r>
-              <a:r>
-                <a:rPr lang="en-US" altLang="ko-KR" sz="900" dirty="0" smtClean="0"/>
-                <a:t>      </a:t>
-              </a:r>
-              <a:r>
-                <a:rPr lang="en-US" altLang="ko-KR" sz="900" dirty="0"/>
-                <a:t>0</a:t>
-              </a:r>
-              <a:endParaRPr lang="ko-KR" altLang="en-US" sz="900" dirty="0"/>
-            </a:p>
-          </p:txBody>
-        </p:sp>
-        <p:sp>
-          <p:nvSpPr>
-            <p:cNvPr id="167" name="타원 166">
-              <a:extLst>
-                <a:ext uri="{FF2B5EF4-FFF2-40B4-BE49-F238E27FC236}">
-                  <a16:creationId xmlns:a16="http://schemas.microsoft.com/office/drawing/2014/main" id="{062CD61B-4FFA-46C8-A4F3-407F780177E2}"/>
-                </a:ext>
-              </a:extLst>
-            </p:cNvPr>
-            <p:cNvSpPr/>
-            <p:nvPr/>
-          </p:nvSpPr>
-          <p:spPr>
-            <a:xfrm>
-              <a:off x="4167133" y="3575844"/>
-              <a:ext cx="66577" cy="66577"/>
-            </a:xfrm>
-            <a:prstGeom prst="ellipse">
-              <a:avLst/>
-            </a:prstGeom>
-          </p:spPr>
-          <p:style>
-            <a:lnRef idx="2">
-              <a:schemeClr val="accent1">
-                <a:shade val="50000"/>
-              </a:schemeClr>
-            </a:lnRef>
-            <a:fillRef idx="1">
-              <a:schemeClr val="accent1"/>
-            </a:fillRef>
-            <a:effectRef idx="0">
-              <a:schemeClr val="accent1"/>
-            </a:effectRef>
-            <a:fontRef idx="minor">
-              <a:schemeClr val="lt1"/>
-            </a:fontRef>
-          </p:style>
-          <p:txBody>
-            <a:bodyPr rtlCol="0" anchor="ctr"/>
-            <a:lstStyle/>
-            <a:p>
-              <a:pPr algn="ctr"/>
-              <a:endParaRPr lang="ko-KR" altLang="en-US" sz="1100" dirty="0"/>
-            </a:p>
-          </p:txBody>
-        </p:sp>
-        <p:sp>
-          <p:nvSpPr>
-            <p:cNvPr id="168" name="타원 167">
-              <a:extLst>
-                <a:ext uri="{FF2B5EF4-FFF2-40B4-BE49-F238E27FC236}">
-                  <a16:creationId xmlns:a16="http://schemas.microsoft.com/office/drawing/2014/main" id="{062CD61B-4FFA-46C8-A4F3-407F780177E2}"/>
-                </a:ext>
-              </a:extLst>
-            </p:cNvPr>
-            <p:cNvSpPr/>
-            <p:nvPr/>
-          </p:nvSpPr>
-          <p:spPr>
-            <a:xfrm>
-              <a:off x="3663563" y="3575844"/>
-              <a:ext cx="66577" cy="66577"/>
-            </a:xfrm>
-            <a:prstGeom prst="ellipse">
-              <a:avLst/>
-            </a:prstGeom>
-          </p:spPr>
-          <p:style>
-            <a:lnRef idx="2">
-              <a:schemeClr val="accent1">
-                <a:shade val="50000"/>
-              </a:schemeClr>
-            </a:lnRef>
-            <a:fillRef idx="1">
-              <a:schemeClr val="accent1"/>
-            </a:fillRef>
-            <a:effectRef idx="0">
-              <a:schemeClr val="accent1"/>
-            </a:effectRef>
-            <a:fontRef idx="minor">
-              <a:schemeClr val="lt1"/>
-            </a:fontRef>
-          </p:style>
-          <p:txBody>
-            <a:bodyPr rtlCol="0" anchor="ctr"/>
-            <a:lstStyle/>
-            <a:p>
-              <a:pPr algn="ctr"/>
-              <a:endParaRPr lang="ko-KR" altLang="en-US" sz="1100" dirty="0"/>
-            </a:p>
-          </p:txBody>
-        </p:sp>
-      </p:grpSp>
       <p:grpSp>
         <p:nvGrpSpPr>
           <p:cNvPr id="172" name="그룹 171">
@@ -19773,7 +19547,11 @@
             <a:p>
               <a:pPr algn="ctr"/>
               <a:r>
-                <a:rPr lang="en-US" altLang="ko-KR" sz="900" dirty="0" err="1" smtClean="0"/>
+                <a:rPr lang="en-US" altLang="ko-KR" sz="900" dirty="0"/>
+                <a:t>[17:0]</a:t>
+              </a:r>
+              <a:r>
+                <a:rPr lang="en-US" altLang="ko-KR" sz="900" dirty="0" err="1"/>
                 <a:t>force_value</a:t>
               </a:r>
               <a:endParaRPr lang="ko-KR" altLang="en-US" sz="900" dirty="0"/>
@@ -19842,19 +19620,19 @@
           <p:cNvCxnSpPr>
             <a:cxnSpLocks/>
             <a:stCxn id="173" idx="2"/>
-            <a:endCxn id="168" idx="4"/>
+            <a:endCxn id="139" idx="4"/>
           </p:cNvCxnSpPr>
           <p:nvPr/>
         </p:nvCxnSpPr>
         <p:spPr>
           <a:xfrm rot="5400000" flipH="1" flipV="1">
-            <a:off x="3569983" y="2932724"/>
-            <a:ext cx="2874911" cy="2096824"/>
+            <a:off x="3286546" y="2658058"/>
+            <a:ext cx="3433014" cy="2088052"/>
           </a:xfrm>
           <a:prstGeom prst="bentConnector4">
             <a:avLst>
-              <a:gd name="adj1" fmla="val -7952"/>
-              <a:gd name="adj2" fmla="val 110902"/>
+              <a:gd name="adj1" fmla="val -6659"/>
+              <a:gd name="adj2" fmla="val 110948"/>
             </a:avLst>
           </a:prstGeom>
           <a:ln>
@@ -19944,8 +19722,8 @@
         </p:nvCxnSpPr>
         <p:spPr>
           <a:xfrm rot="16200000" flipV="1">
-            <a:off x="4133632" y="4753916"/>
-            <a:ext cx="137139" cy="3558"/>
+            <a:off x="4086803" y="4707087"/>
+            <a:ext cx="230797" cy="3558"/>
           </a:xfrm>
           <a:prstGeom prst="bentConnector3">
             <a:avLst>
@@ -19983,18 +19761,18 @@
           <p:cNvCxnSpPr>
             <a:cxnSpLocks/>
             <a:stCxn id="54" idx="1"/>
-            <a:endCxn id="167" idx="4"/>
+            <a:endCxn id="137" idx="4"/>
           </p:cNvCxnSpPr>
           <p:nvPr/>
         </p:nvCxnSpPr>
         <p:spPr>
           <a:xfrm rot="10800000">
-            <a:off x="6055851" y="2040110"/>
-            <a:ext cx="2172424" cy="3634"/>
+            <a:off x="6047079" y="1532602"/>
+            <a:ext cx="2181196" cy="511142"/>
           </a:xfrm>
           <a:prstGeom prst="bentConnector3">
             <a:avLst>
-              <a:gd name="adj1" fmla="val 50000"/>
+              <a:gd name="adj1" fmla="val 67730"/>
             </a:avLst>
           </a:prstGeom>
           <a:ln>
@@ -20020,15 +19798,16 @@
         <p:nvCxnSpPr>
           <p:cNvPr id="193" name="꺾인 연결선 192"/>
           <p:cNvCxnSpPr>
-            <a:stCxn id="166" idx="0"/>
+            <a:cxnSpLocks/>
+            <a:stCxn id="149" idx="0"/>
             <a:endCxn id="65" idx="0"/>
           </p:cNvCxnSpPr>
           <p:nvPr/>
         </p:nvCxnSpPr>
         <p:spPr>
           <a:xfrm rot="10800000" flipV="1">
-            <a:off x="3505913" y="2289490"/>
-            <a:ext cx="2295242" cy="314696"/>
+            <a:off x="3505914" y="1988334"/>
+            <a:ext cx="1615975" cy="615852"/>
           </a:xfrm>
           <a:prstGeom prst="bentConnector2">
             <a:avLst/>
@@ -20108,8 +19887,8 @@
         </p:nvCxnSpPr>
         <p:spPr>
           <a:xfrm rot="5400000" flipH="1" flipV="1">
-            <a:off x="4573070" y="2684205"/>
-            <a:ext cx="664337" cy="1899927"/>
+            <a:off x="4568307" y="2688968"/>
+            <a:ext cx="664337" cy="1890401"/>
           </a:xfrm>
           <a:prstGeom prst="bentConnector3">
             <a:avLst>
@@ -20181,17 +19960,21 @@
           </p:cNvPr>
           <p:cNvCxnSpPr>
             <a:cxnSpLocks/>
-            <a:endCxn id="157" idx="1"/>
+            <a:stCxn id="229" idx="2"/>
+            <a:endCxn id="251" idx="4"/>
           </p:cNvCxnSpPr>
           <p:nvPr/>
         </p:nvCxnSpPr>
         <p:spPr>
-          <a:xfrm rot="5400000" flipH="1" flipV="1">
-            <a:off x="1681187" y="4945867"/>
-            <a:ext cx="2404933" cy="676384"/>
-          </a:xfrm>
-          <a:prstGeom prst="bentConnector2">
-            <a:avLst/>
+          <a:xfrm rot="10800000" flipH="1">
+            <a:off x="2759226" y="5012896"/>
+            <a:ext cx="1042067" cy="1164476"/>
+          </a:xfrm>
+          <a:prstGeom prst="bentConnector4">
+            <a:avLst>
+              <a:gd name="adj1" fmla="val -21937"/>
+              <a:gd name="adj2" fmla="val 91012"/>
+            </a:avLst>
           </a:prstGeom>
           <a:ln>
             <a:tailEnd type="triangle"/>
@@ -20223,14 +20006,15 @@
           </p:cNvPr>
           <p:cNvCxnSpPr>
             <a:cxnSpLocks/>
+            <a:stCxn id="229" idx="1"/>
             <a:endCxn id="173" idx="1"/>
           </p:cNvCxnSpPr>
           <p:nvPr/>
         </p:nvCxnSpPr>
         <p:spPr>
           <a:xfrm rot="5400000" flipH="1" flipV="1">
-            <a:off x="2355660" y="5616588"/>
-            <a:ext cx="1183190" cy="556684"/>
+            <a:off x="2824010" y="5423672"/>
+            <a:ext cx="521924" cy="281250"/>
           </a:xfrm>
           <a:prstGeom prst="bentConnector2">
             <a:avLst/>
@@ -20268,8 +20052,8 @@
         </p:nvSpPr>
         <p:spPr>
           <a:xfrm>
-            <a:off x="3892633" y="1511684"/>
-            <a:ext cx="796071" cy="735946"/>
+            <a:off x="5386053" y="529717"/>
+            <a:ext cx="1032447" cy="735946"/>
           </a:xfrm>
           <a:prstGeom prst="rect">
             <a:avLst/>
@@ -20300,7 +20084,7 @@
           <a:lstStyle/>
           <a:p>
             <a:r>
-              <a:rPr lang="en-US" altLang="ko-KR" sz="900" dirty="0" err="1" smtClean="0">
+              <a:rPr lang="en-US" altLang="ko-KR" sz="900" dirty="0" err="1">
                 <a:solidFill>
                   <a:schemeClr val="tx1"/>
                 </a:solidFill>
@@ -20308,43 +20092,27 @@
               <a:t>Sel</a:t>
             </a:r>
             <a:r>
-              <a:rPr lang="en-US" altLang="ko-KR" sz="900" dirty="0" smtClean="0">
+              <a:rPr lang="en-US" altLang="ko-KR" sz="900" dirty="0">
                 <a:solidFill>
                   <a:schemeClr val="tx1"/>
                 </a:solidFill>
               </a:rPr>
-              <a:t> </a:t>
-            </a:r>
-            <a:r>
-              <a:rPr lang="en-US" altLang="ko-KR" sz="900" dirty="0" err="1" smtClean="0">
+              <a:t> check mux</a:t>
+            </a:r>
+          </a:p>
+          <a:p>
+            <a:r>
+              <a:rPr lang="en-US" altLang="ko-KR" sz="900" dirty="0">
                 <a:solidFill>
                   <a:schemeClr val="tx1"/>
                 </a:solidFill>
               </a:rPr>
-              <a:t>eq</a:t>
-            </a:r>
-            <a:r>
-              <a:rPr lang="en-US" altLang="ko-KR" sz="900" dirty="0" smtClean="0">
-                <a:solidFill>
-                  <a:schemeClr val="tx1"/>
-                </a:solidFill>
-              </a:rPr>
-              <a:t> mux</a:t>
+              <a:t>0 0    2</a:t>
             </a:r>
           </a:p>
           <a:p>
             <a:r>
-              <a:rPr lang="en-US" altLang="ko-KR" sz="900" dirty="0" smtClean="0">
-                <a:solidFill>
-                  <a:schemeClr val="tx1"/>
-                </a:solidFill>
-              </a:rPr>
-              <a:t>0 0    0</a:t>
-            </a:r>
-          </a:p>
-          <a:p>
-            <a:r>
-              <a:rPr lang="en-US" altLang="ko-KR" sz="900" dirty="0" smtClean="0">
+              <a:rPr lang="en-US" altLang="ko-KR" sz="900" dirty="0">
                 <a:solidFill>
                   <a:schemeClr val="tx1"/>
                 </a:solidFill>
@@ -20354,33 +20122,17 @@
           </a:p>
           <a:p>
             <a:r>
-              <a:rPr lang="en-US" altLang="ko-KR" sz="900" dirty="0" smtClean="0">
-                <a:solidFill>
-                  <a:schemeClr val="tx1"/>
-                </a:solidFill>
-              </a:rPr>
-              <a:t>1 0</a:t>
-            </a:r>
-            <a:r>
               <a:rPr lang="en-US" altLang="ko-KR" sz="900" dirty="0">
                 <a:solidFill>
                   <a:schemeClr val="tx1"/>
                 </a:solidFill>
               </a:rPr>
-              <a:t>  </a:t>
-            </a:r>
-            <a:r>
-              <a:rPr lang="en-US" altLang="ko-KR" sz="900" dirty="0" smtClean="0">
-                <a:solidFill>
-                  <a:schemeClr val="tx1"/>
-                </a:solidFill>
-              </a:rPr>
-              <a:t>  1</a:t>
+              <a:t>1 0    1</a:t>
             </a:r>
           </a:p>
           <a:p>
             <a:r>
-              <a:rPr lang="en-US" altLang="ko-KR" sz="900" dirty="0" smtClean="0">
+              <a:rPr lang="en-US" altLang="ko-KR" sz="900" dirty="0">
                 <a:solidFill>
                   <a:schemeClr val="tx1"/>
                 </a:solidFill>
@@ -20413,8 +20165,8 @@
         </p:nvCxnSpPr>
         <p:spPr>
           <a:xfrm rot="10800000">
-            <a:off x="6003173" y="3237533"/>
-            <a:ext cx="1433764" cy="807966"/>
+            <a:off x="5993648" y="3237533"/>
+            <a:ext cx="663245" cy="807966"/>
           </a:xfrm>
           <a:prstGeom prst="bentConnector2">
             <a:avLst/>
@@ -20452,7 +20204,7 @@
         </p:nvGrpSpPr>
         <p:grpSpPr>
           <a:xfrm rot="16200000">
-            <a:off x="5722021" y="2980558"/>
+            <a:off x="5712495" y="2980558"/>
             <a:ext cx="414283" cy="228600"/>
             <a:chOff x="2011036" y="2978803"/>
             <a:chExt cx="414283" cy="228600"/>
@@ -20678,14 +20430,14 @@
           <p:cNvCxnSpPr>
             <a:cxnSpLocks/>
             <a:stCxn id="225" idx="6"/>
-            <a:endCxn id="166" idx="1"/>
+            <a:endCxn id="135" idx="1"/>
           </p:cNvCxnSpPr>
           <p:nvPr/>
         </p:nvCxnSpPr>
         <p:spPr>
-          <a:xfrm rot="16200000" flipV="1">
-            <a:off x="5779009" y="2737560"/>
-            <a:ext cx="299934" cy="378"/>
+          <a:xfrm rot="5400000" flipH="1" flipV="1">
+            <a:off x="5507919" y="2475622"/>
+            <a:ext cx="823814" cy="375"/>
           </a:xfrm>
           <a:prstGeom prst="bentConnector3">
             <a:avLst>
@@ -20887,7 +20639,7 @@
           </a:xfrm>
           <a:prstGeom prst="bentConnector3">
             <a:avLst>
-              <a:gd name="adj1" fmla="val 139073"/>
+              <a:gd name="adj1" fmla="val 149729"/>
             </a:avLst>
           </a:prstGeom>
           <a:ln>
@@ -21118,17 +20870,20 @@
           </p:cNvPr>
           <p:cNvCxnSpPr>
             <a:cxnSpLocks/>
+            <a:stCxn id="230" idx="3"/>
             <a:endCxn id="253" idx="2"/>
           </p:cNvCxnSpPr>
           <p:nvPr/>
         </p:nvCxnSpPr>
         <p:spPr>
-          <a:xfrm rot="5400000" flipH="1" flipV="1">
-            <a:off x="5610531" y="4257447"/>
-            <a:ext cx="3571394" cy="715312"/>
-          </a:xfrm>
-          <a:prstGeom prst="bentConnector2">
-            <a:avLst/>
+          <a:xfrm flipV="1">
+            <a:off x="4023307" y="2829406"/>
+            <a:ext cx="3730577" cy="3347966"/>
+          </a:xfrm>
+          <a:prstGeom prst="bentConnector3">
+            <a:avLst>
+              <a:gd name="adj1" fmla="val 83192"/>
+            </a:avLst>
           </a:prstGeom>
           <a:ln>
             <a:tailEnd type="triangle"/>
@@ -21172,7 +20927,7 @@
           </a:xfrm>
           <a:prstGeom prst="bentConnector3">
             <a:avLst>
-              <a:gd name="adj1" fmla="val 117169"/>
+              <a:gd name="adj1" fmla="val 124273"/>
             </a:avLst>
           </a:prstGeom>
           <a:ln>
@@ -21250,17 +21005,21 @@
           </p:cNvPr>
           <p:cNvCxnSpPr>
             <a:cxnSpLocks/>
+            <a:stCxn id="229" idx="5"/>
             <a:endCxn id="60" idx="1"/>
           </p:cNvCxnSpPr>
           <p:nvPr/>
         </p:nvCxnSpPr>
         <p:spPr>
           <a:xfrm rot="5400000" flipH="1" flipV="1">
-            <a:off x="6741432" y="4913958"/>
-            <a:ext cx="2642556" cy="331129"/>
-          </a:xfrm>
-          <a:prstGeom prst="bentConnector2">
-            <a:avLst/>
+            <a:off x="4647611" y="2948820"/>
+            <a:ext cx="2771240" cy="4390088"/>
+          </a:xfrm>
+          <a:prstGeom prst="bentConnector4">
+            <a:avLst>
+              <a:gd name="adj1" fmla="val 344"/>
+              <a:gd name="adj2" fmla="val 85087"/>
+            </a:avLst>
           </a:prstGeom>
           <a:ln>
             <a:tailEnd type="triangle"/>
@@ -21292,17 +21051,21 @@
           </p:cNvPr>
           <p:cNvCxnSpPr>
             <a:cxnSpLocks/>
+            <a:stCxn id="229" idx="5"/>
             <a:endCxn id="140" idx="1"/>
           </p:cNvCxnSpPr>
           <p:nvPr/>
         </p:nvCxnSpPr>
         <p:spPr>
           <a:xfrm rot="5400000" flipH="1" flipV="1">
-            <a:off x="7069651" y="5242176"/>
-            <a:ext cx="2083627" cy="233622"/>
-          </a:xfrm>
-          <a:prstGeom prst="bentConnector2">
-            <a:avLst/>
+            <a:off x="4927075" y="3228285"/>
+            <a:ext cx="2212311" cy="4390088"/>
+          </a:xfrm>
+          <a:prstGeom prst="bentConnector4">
+            <a:avLst>
+              <a:gd name="adj1" fmla="val -10333"/>
+              <a:gd name="adj2" fmla="val 94850"/>
+            </a:avLst>
           </a:prstGeom>
           <a:ln>
             <a:tailEnd type="triangle"/>
@@ -21334,17 +21097,1130 @@
           </p:cNvPr>
           <p:cNvCxnSpPr>
             <a:cxnSpLocks/>
+            <a:stCxn id="229" idx="5"/>
             <a:endCxn id="93" idx="1"/>
           </p:cNvCxnSpPr>
           <p:nvPr/>
         </p:nvCxnSpPr>
         <p:spPr>
           <a:xfrm rot="5400000" flipH="1" flipV="1">
-            <a:off x="7580359" y="5752887"/>
-            <a:ext cx="1168095" cy="127737"/>
+            <a:off x="5384842" y="3686052"/>
+            <a:ext cx="1296777" cy="4390088"/>
+          </a:xfrm>
+          <a:prstGeom prst="bentConnector4">
+            <a:avLst>
+              <a:gd name="adj1" fmla="val -17628"/>
+              <a:gd name="adj2" fmla="val 94850"/>
+            </a:avLst>
+          </a:prstGeom>
+          <a:ln>
+            <a:tailEnd type="triangle"/>
+          </a:ln>
+        </p:spPr>
+        <p:style>
+          <a:lnRef idx="1">
+            <a:schemeClr val="accent1"/>
+          </a:lnRef>
+          <a:fillRef idx="0">
+            <a:schemeClr val="accent1"/>
+          </a:fillRef>
+          <a:effectRef idx="0">
+            <a:schemeClr val="accent1"/>
+          </a:effectRef>
+          <a:fontRef idx="minor">
+            <a:schemeClr val="tx1"/>
+          </a:fontRef>
+        </p:style>
+      </p:cxnSp>
+      <p:cxnSp>
+        <p:nvCxnSpPr>
+          <p:cNvPr id="15" name="연결선: 꺾임 14">
+            <a:extLst>
+              <a:ext uri="{FF2B5EF4-FFF2-40B4-BE49-F238E27FC236}">
+                <a16:creationId xmlns:a16="http://schemas.microsoft.com/office/drawing/2014/main" id="{73ABD2B1-71C1-4A7E-9A94-9AA9BB1A999C}"/>
+              </a:ext>
+            </a:extLst>
+          </p:cNvPr>
+          <p:cNvCxnSpPr>
+            <a:cxnSpLocks/>
+            <a:stCxn id="149" idx="0"/>
+            <a:endCxn id="154" idx="4"/>
+          </p:cNvCxnSpPr>
+          <p:nvPr/>
+        </p:nvCxnSpPr>
+        <p:spPr>
+          <a:xfrm rot="10800000" flipH="1" flipV="1">
+            <a:off x="5121887" y="1988333"/>
+            <a:ext cx="254697" cy="225843"/>
+          </a:xfrm>
+          <a:prstGeom prst="bentConnector5">
+            <a:avLst>
+              <a:gd name="adj1" fmla="val -89754"/>
+              <a:gd name="adj2" fmla="val -209579"/>
+              <a:gd name="adj3" fmla="val 189754"/>
+            </a:avLst>
+          </a:prstGeom>
+          <a:ln>
+            <a:tailEnd type="triangle"/>
+          </a:ln>
+        </p:spPr>
+        <p:style>
+          <a:lnRef idx="1">
+            <a:schemeClr val="accent1"/>
+          </a:lnRef>
+          <a:fillRef idx="0">
+            <a:schemeClr val="accent1"/>
+          </a:fillRef>
+          <a:effectRef idx="0">
+            <a:schemeClr val="accent1"/>
+          </a:effectRef>
+          <a:fontRef idx="minor">
+            <a:schemeClr val="tx1"/>
+          </a:fontRef>
+        </p:style>
+      </p:cxnSp>
+      <p:grpSp>
+        <p:nvGrpSpPr>
+          <p:cNvPr id="134" name="그룹 133">
+            <a:extLst>
+              <a:ext uri="{FF2B5EF4-FFF2-40B4-BE49-F238E27FC236}">
+                <a16:creationId xmlns:a16="http://schemas.microsoft.com/office/drawing/2014/main" id="{0829403D-35CF-454A-A817-2C8EE062F5F5}"/>
+              </a:ext>
+            </a:extLst>
+          </p:cNvPr>
+          <p:cNvGrpSpPr/>
+          <p:nvPr/>
+        </p:nvGrpSpPr>
+        <p:grpSpPr>
+          <a:xfrm rot="16200000">
+            <a:off x="5564887" y="1632102"/>
+            <a:ext cx="710252" cy="255263"/>
+            <a:chOff x="3601793" y="3387727"/>
+            <a:chExt cx="710252" cy="255263"/>
+          </a:xfrm>
+        </p:grpSpPr>
+        <p:sp>
+          <p:nvSpPr>
+            <p:cNvPr id="135" name="사다리꼴 134">
+              <a:extLst>
+                <a:ext uri="{FF2B5EF4-FFF2-40B4-BE49-F238E27FC236}">
+                  <a16:creationId xmlns:a16="http://schemas.microsoft.com/office/drawing/2014/main" id="{53F7745F-8D35-4681-A9F8-42FC63D6F876}"/>
+                </a:ext>
+              </a:extLst>
+            </p:cNvPr>
+            <p:cNvSpPr/>
+            <p:nvPr/>
+          </p:nvSpPr>
+          <p:spPr>
+            <a:xfrm>
+              <a:off x="3601793" y="3387727"/>
+              <a:ext cx="710252" cy="255263"/>
+            </a:xfrm>
+            <a:prstGeom prst="trapezoid">
+              <a:avLst>
+                <a:gd name="adj" fmla="val 39926"/>
+              </a:avLst>
+            </a:prstGeom>
+          </p:spPr>
+          <p:style>
+            <a:lnRef idx="2">
+              <a:schemeClr val="accent1">
+                <a:shade val="50000"/>
+              </a:schemeClr>
+            </a:lnRef>
+            <a:fillRef idx="1">
+              <a:schemeClr val="accent1"/>
+            </a:fillRef>
+            <a:effectRef idx="0">
+              <a:schemeClr val="accent1"/>
+            </a:effectRef>
+            <a:fontRef idx="minor">
+              <a:schemeClr val="lt1"/>
+            </a:fontRef>
+          </p:style>
+          <p:txBody>
+            <a:bodyPr rtlCol="0" anchor="ctr"/>
+            <a:lstStyle/>
+            <a:p>
+              <a:pPr algn="ctr"/>
+              <a:r>
+                <a:rPr lang="en-US" altLang="ko-KR" sz="900" dirty="0"/>
+                <a:t>1      0</a:t>
+              </a:r>
+              <a:endParaRPr lang="ko-KR" altLang="en-US" sz="900" dirty="0"/>
+            </a:p>
+          </p:txBody>
+        </p:sp>
+        <p:sp>
+          <p:nvSpPr>
+            <p:cNvPr id="137" name="타원 136">
+              <a:extLst>
+                <a:ext uri="{FF2B5EF4-FFF2-40B4-BE49-F238E27FC236}">
+                  <a16:creationId xmlns:a16="http://schemas.microsoft.com/office/drawing/2014/main" id="{55A7DD9E-1125-49FA-AC0B-BE5B2A780496}"/>
+                </a:ext>
+              </a:extLst>
+            </p:cNvPr>
+            <p:cNvSpPr/>
+            <p:nvPr/>
+          </p:nvSpPr>
+          <p:spPr>
+            <a:xfrm>
+              <a:off x="4150761" y="3575847"/>
+              <a:ext cx="66577" cy="66577"/>
+            </a:xfrm>
+            <a:prstGeom prst="ellipse">
+              <a:avLst/>
+            </a:prstGeom>
+          </p:spPr>
+          <p:style>
+            <a:lnRef idx="2">
+              <a:schemeClr val="accent1">
+                <a:shade val="50000"/>
+              </a:schemeClr>
+            </a:lnRef>
+            <a:fillRef idx="1">
+              <a:schemeClr val="accent1"/>
+            </a:fillRef>
+            <a:effectRef idx="0">
+              <a:schemeClr val="accent1"/>
+            </a:effectRef>
+            <a:fontRef idx="minor">
+              <a:schemeClr val="lt1"/>
+            </a:fontRef>
+          </p:style>
+          <p:txBody>
+            <a:bodyPr rtlCol="0" anchor="ctr"/>
+            <a:lstStyle/>
+            <a:p>
+              <a:pPr algn="ctr"/>
+              <a:endParaRPr lang="ko-KR" altLang="en-US" sz="1100" dirty="0"/>
+            </a:p>
+          </p:txBody>
+        </p:sp>
+        <p:sp>
+          <p:nvSpPr>
+            <p:cNvPr id="139" name="타원 138">
+              <a:extLst>
+                <a:ext uri="{FF2B5EF4-FFF2-40B4-BE49-F238E27FC236}">
+                  <a16:creationId xmlns:a16="http://schemas.microsoft.com/office/drawing/2014/main" id="{33A8D484-91D8-4D8D-BCD5-31504FB5597E}"/>
+                </a:ext>
+              </a:extLst>
+            </p:cNvPr>
+            <p:cNvSpPr/>
+            <p:nvPr/>
+          </p:nvSpPr>
+          <p:spPr>
+            <a:xfrm>
+              <a:off x="3697786" y="3575847"/>
+              <a:ext cx="66577" cy="66577"/>
+            </a:xfrm>
+            <a:prstGeom prst="ellipse">
+              <a:avLst/>
+            </a:prstGeom>
+          </p:spPr>
+          <p:style>
+            <a:lnRef idx="2">
+              <a:schemeClr val="accent1">
+                <a:shade val="50000"/>
+              </a:schemeClr>
+            </a:lnRef>
+            <a:fillRef idx="1">
+              <a:schemeClr val="accent1"/>
+            </a:fillRef>
+            <a:effectRef idx="0">
+              <a:schemeClr val="accent1"/>
+            </a:effectRef>
+            <a:fontRef idx="minor">
+              <a:schemeClr val="lt1"/>
+            </a:fontRef>
+          </p:style>
+          <p:txBody>
+            <a:bodyPr rtlCol="0" anchor="ctr"/>
+            <a:lstStyle/>
+            <a:p>
+              <a:pPr algn="ctr"/>
+              <a:endParaRPr lang="ko-KR" altLang="en-US" sz="1100" dirty="0"/>
+            </a:p>
+          </p:txBody>
+        </p:sp>
+      </p:grpSp>
+      <p:grpSp>
+        <p:nvGrpSpPr>
+          <p:cNvPr id="141" name="그룹 140">
+            <a:extLst>
+              <a:ext uri="{FF2B5EF4-FFF2-40B4-BE49-F238E27FC236}">
+                <a16:creationId xmlns:a16="http://schemas.microsoft.com/office/drawing/2014/main" id="{50422E23-28F1-44CD-8D9C-E76AD43A4A31}"/>
+              </a:ext>
+            </a:extLst>
+          </p:cNvPr>
+          <p:cNvGrpSpPr/>
+          <p:nvPr/>
+        </p:nvGrpSpPr>
+        <p:grpSpPr>
+          <a:xfrm rot="16200000">
+            <a:off x="5059946" y="2486331"/>
+            <a:ext cx="379146" cy="228600"/>
+            <a:chOff x="7728928" y="2828040"/>
+            <a:chExt cx="379146" cy="228600"/>
+          </a:xfrm>
+        </p:grpSpPr>
+        <p:sp>
+          <p:nvSpPr>
+            <p:cNvPr id="142" name="타원 141">
+              <a:extLst>
+                <a:ext uri="{FF2B5EF4-FFF2-40B4-BE49-F238E27FC236}">
+                  <a16:creationId xmlns:a16="http://schemas.microsoft.com/office/drawing/2014/main" id="{87408A0D-85F5-4109-AFCA-C8A40D54F3B5}"/>
+                </a:ext>
+              </a:extLst>
+            </p:cNvPr>
+            <p:cNvSpPr/>
+            <p:nvPr/>
+          </p:nvSpPr>
+          <p:spPr>
+            <a:xfrm>
+              <a:off x="7728928" y="2844342"/>
+              <a:ext cx="51410" cy="51410"/>
+            </a:xfrm>
+            <a:prstGeom prst="ellipse">
+              <a:avLst/>
+            </a:prstGeom>
+          </p:spPr>
+          <p:style>
+            <a:lnRef idx="2">
+              <a:schemeClr val="accent1">
+                <a:shade val="50000"/>
+              </a:schemeClr>
+            </a:lnRef>
+            <a:fillRef idx="1">
+              <a:schemeClr val="accent1"/>
+            </a:fillRef>
+            <a:effectRef idx="0">
+              <a:schemeClr val="accent1"/>
+            </a:effectRef>
+            <a:fontRef idx="minor">
+              <a:schemeClr val="lt1"/>
+            </a:fontRef>
+          </p:style>
+          <p:txBody>
+            <a:bodyPr rtlCol="0" anchor="ctr"/>
+            <a:lstStyle/>
+            <a:p>
+              <a:pPr algn="ctr"/>
+              <a:endParaRPr lang="ko-KR" altLang="en-US"/>
+            </a:p>
+          </p:txBody>
+        </p:sp>
+        <p:sp>
+          <p:nvSpPr>
+            <p:cNvPr id="143" name="타원 142">
+              <a:extLst>
+                <a:ext uri="{FF2B5EF4-FFF2-40B4-BE49-F238E27FC236}">
+                  <a16:creationId xmlns:a16="http://schemas.microsoft.com/office/drawing/2014/main" id="{0BD2B83C-C467-4328-8D53-5BC4B9B1D79B}"/>
+                </a:ext>
+              </a:extLst>
+            </p:cNvPr>
+            <p:cNvSpPr/>
+            <p:nvPr/>
+          </p:nvSpPr>
+          <p:spPr>
+            <a:xfrm>
+              <a:off x="7728928" y="2992313"/>
+              <a:ext cx="51410" cy="51410"/>
+            </a:xfrm>
+            <a:prstGeom prst="ellipse">
+              <a:avLst/>
+            </a:prstGeom>
+          </p:spPr>
+          <p:style>
+            <a:lnRef idx="2">
+              <a:schemeClr val="accent1">
+                <a:shade val="50000"/>
+              </a:schemeClr>
+            </a:lnRef>
+            <a:fillRef idx="1">
+              <a:schemeClr val="accent1"/>
+            </a:fillRef>
+            <a:effectRef idx="0">
+              <a:schemeClr val="accent1"/>
+            </a:effectRef>
+            <a:fontRef idx="minor">
+              <a:schemeClr val="lt1"/>
+            </a:fontRef>
+          </p:style>
+          <p:txBody>
+            <a:bodyPr rtlCol="0" anchor="ctr"/>
+            <a:lstStyle/>
+            <a:p>
+              <a:pPr algn="ctr"/>
+              <a:endParaRPr lang="ko-KR" altLang="en-US"/>
+            </a:p>
+          </p:txBody>
+        </p:sp>
+        <p:sp>
+          <p:nvSpPr>
+            <p:cNvPr id="146" name="순서도: 지연 145">
+              <a:extLst>
+                <a:ext uri="{FF2B5EF4-FFF2-40B4-BE49-F238E27FC236}">
+                  <a16:creationId xmlns:a16="http://schemas.microsoft.com/office/drawing/2014/main" id="{A2F94FB7-1F17-4BB8-B35C-5D0C9E8E6FC3}"/>
+                </a:ext>
+              </a:extLst>
+            </p:cNvPr>
+            <p:cNvSpPr/>
+            <p:nvPr/>
+          </p:nvSpPr>
+          <p:spPr>
+            <a:xfrm>
+              <a:off x="7793772" y="2828040"/>
+              <a:ext cx="314302" cy="228600"/>
+            </a:xfrm>
+            <a:prstGeom prst="flowChartDelay">
+              <a:avLst/>
+            </a:prstGeom>
+          </p:spPr>
+          <p:style>
+            <a:lnRef idx="2">
+              <a:schemeClr val="accent1">
+                <a:shade val="50000"/>
+              </a:schemeClr>
+            </a:lnRef>
+            <a:fillRef idx="1">
+              <a:schemeClr val="accent1"/>
+            </a:fillRef>
+            <a:effectRef idx="0">
+              <a:schemeClr val="accent1"/>
+            </a:effectRef>
+            <a:fontRef idx="minor">
+              <a:schemeClr val="lt1"/>
+            </a:fontRef>
+          </p:style>
+          <p:txBody>
+            <a:bodyPr rtlCol="0" anchor="ctr"/>
+            <a:lstStyle/>
+            <a:p>
+              <a:pPr algn="ctr"/>
+              <a:endParaRPr lang="ko-KR" altLang="en-US"/>
+            </a:p>
+          </p:txBody>
+        </p:sp>
+      </p:grpSp>
+      <p:grpSp>
+        <p:nvGrpSpPr>
+          <p:cNvPr id="148" name="그룹 147">
+            <a:extLst>
+              <a:ext uri="{FF2B5EF4-FFF2-40B4-BE49-F238E27FC236}">
+                <a16:creationId xmlns:a16="http://schemas.microsoft.com/office/drawing/2014/main" id="{F2270BA3-D18B-48BA-A171-4E912338219F}"/>
+              </a:ext>
+            </a:extLst>
+          </p:cNvPr>
+          <p:cNvGrpSpPr/>
+          <p:nvPr/>
+        </p:nvGrpSpPr>
+        <p:grpSpPr>
+          <a:xfrm rot="16200000">
+            <a:off x="4894393" y="1860702"/>
+            <a:ext cx="710252" cy="255263"/>
+            <a:chOff x="3601793" y="3387727"/>
+            <a:chExt cx="710252" cy="255263"/>
+          </a:xfrm>
+        </p:grpSpPr>
+        <p:sp>
+          <p:nvSpPr>
+            <p:cNvPr id="149" name="사다리꼴 148">
+              <a:extLst>
+                <a:ext uri="{FF2B5EF4-FFF2-40B4-BE49-F238E27FC236}">
+                  <a16:creationId xmlns:a16="http://schemas.microsoft.com/office/drawing/2014/main" id="{93DC22F8-CE88-4268-A527-4C2124594752}"/>
+                </a:ext>
+              </a:extLst>
+            </p:cNvPr>
+            <p:cNvSpPr/>
+            <p:nvPr/>
+          </p:nvSpPr>
+          <p:spPr>
+            <a:xfrm>
+              <a:off x="3601793" y="3387727"/>
+              <a:ext cx="710252" cy="255263"/>
+            </a:xfrm>
+            <a:prstGeom prst="trapezoid">
+              <a:avLst>
+                <a:gd name="adj" fmla="val 39926"/>
+              </a:avLst>
+            </a:prstGeom>
+          </p:spPr>
+          <p:style>
+            <a:lnRef idx="2">
+              <a:schemeClr val="accent1">
+                <a:shade val="50000"/>
+              </a:schemeClr>
+            </a:lnRef>
+            <a:fillRef idx="1">
+              <a:schemeClr val="accent1"/>
+            </a:fillRef>
+            <a:effectRef idx="0">
+              <a:schemeClr val="accent1"/>
+            </a:effectRef>
+            <a:fontRef idx="minor">
+              <a:schemeClr val="lt1"/>
+            </a:fontRef>
+          </p:style>
+          <p:txBody>
+            <a:bodyPr rtlCol="0" anchor="ctr"/>
+            <a:lstStyle/>
+            <a:p>
+              <a:pPr algn="ctr"/>
+              <a:r>
+                <a:rPr lang="en-US" altLang="ko-KR" sz="900" dirty="0"/>
+                <a:t>1      0</a:t>
+              </a:r>
+              <a:endParaRPr lang="ko-KR" altLang="en-US" sz="900" dirty="0"/>
+            </a:p>
+          </p:txBody>
+        </p:sp>
+        <p:sp>
+          <p:nvSpPr>
+            <p:cNvPr id="153" name="타원 152">
+              <a:extLst>
+                <a:ext uri="{FF2B5EF4-FFF2-40B4-BE49-F238E27FC236}">
+                  <a16:creationId xmlns:a16="http://schemas.microsoft.com/office/drawing/2014/main" id="{199982CA-4A79-4F3C-BD1C-DBFB09979D2D}"/>
+                </a:ext>
+              </a:extLst>
+            </p:cNvPr>
+            <p:cNvSpPr/>
+            <p:nvPr/>
+          </p:nvSpPr>
+          <p:spPr>
+            <a:xfrm>
+              <a:off x="4150761" y="3575847"/>
+              <a:ext cx="66577" cy="66577"/>
+            </a:xfrm>
+            <a:prstGeom prst="ellipse">
+              <a:avLst/>
+            </a:prstGeom>
+          </p:spPr>
+          <p:style>
+            <a:lnRef idx="2">
+              <a:schemeClr val="accent1">
+                <a:shade val="50000"/>
+              </a:schemeClr>
+            </a:lnRef>
+            <a:fillRef idx="1">
+              <a:schemeClr val="accent1"/>
+            </a:fillRef>
+            <a:effectRef idx="0">
+              <a:schemeClr val="accent1"/>
+            </a:effectRef>
+            <a:fontRef idx="minor">
+              <a:schemeClr val="lt1"/>
+            </a:fontRef>
+          </p:style>
+          <p:txBody>
+            <a:bodyPr rtlCol="0" anchor="ctr"/>
+            <a:lstStyle/>
+            <a:p>
+              <a:pPr algn="ctr"/>
+              <a:endParaRPr lang="ko-KR" altLang="en-US" sz="1100" dirty="0"/>
+            </a:p>
+          </p:txBody>
+        </p:sp>
+        <p:sp>
+          <p:nvSpPr>
+            <p:cNvPr id="154" name="타원 153">
+              <a:extLst>
+                <a:ext uri="{FF2B5EF4-FFF2-40B4-BE49-F238E27FC236}">
+                  <a16:creationId xmlns:a16="http://schemas.microsoft.com/office/drawing/2014/main" id="{BAF6DD57-B9E3-4F53-A7C5-998F3CE7A0E8}"/>
+                </a:ext>
+              </a:extLst>
+            </p:cNvPr>
+            <p:cNvSpPr/>
+            <p:nvPr/>
+          </p:nvSpPr>
+          <p:spPr>
+            <a:xfrm>
+              <a:off x="3697786" y="3575847"/>
+              <a:ext cx="66577" cy="66577"/>
+            </a:xfrm>
+            <a:prstGeom prst="ellipse">
+              <a:avLst/>
+            </a:prstGeom>
+          </p:spPr>
+          <p:style>
+            <a:lnRef idx="2">
+              <a:schemeClr val="accent1">
+                <a:shade val="50000"/>
+              </a:schemeClr>
+            </a:lnRef>
+            <a:fillRef idx="1">
+              <a:schemeClr val="accent1"/>
+            </a:fillRef>
+            <a:effectRef idx="0">
+              <a:schemeClr val="accent1"/>
+            </a:effectRef>
+            <a:fontRef idx="minor">
+              <a:schemeClr val="lt1"/>
+            </a:fontRef>
+          </p:style>
+          <p:txBody>
+            <a:bodyPr rtlCol="0" anchor="ctr"/>
+            <a:lstStyle/>
+            <a:p>
+              <a:pPr algn="ctr"/>
+              <a:endParaRPr lang="ko-KR" altLang="en-US" sz="1100" dirty="0"/>
+            </a:p>
+          </p:txBody>
+        </p:sp>
+      </p:grpSp>
+      <p:cxnSp>
+        <p:nvCxnSpPr>
+          <p:cNvPr id="160" name="연결선: 꺾임 129">
+            <a:extLst>
+              <a:ext uri="{FF2B5EF4-FFF2-40B4-BE49-F238E27FC236}">
+                <a16:creationId xmlns:a16="http://schemas.microsoft.com/office/drawing/2014/main" id="{05083B80-C1FA-4F99-ACA3-12EB5E108FC1}"/>
+              </a:ext>
+            </a:extLst>
+          </p:cNvPr>
+          <p:cNvCxnSpPr>
+            <a:cxnSpLocks/>
+            <a:stCxn id="157" idx="0"/>
+            <a:endCxn id="142" idx="2"/>
+          </p:cNvCxnSpPr>
+          <p:nvPr/>
+        </p:nvCxnSpPr>
+        <p:spPr>
+          <a:xfrm rot="5400000" flipH="1" flipV="1">
+            <a:off x="3978184" y="2767295"/>
+            <a:ext cx="1176132" cy="1221951"/>
+          </a:xfrm>
+          <a:prstGeom prst="bentConnector3">
+            <a:avLst>
+              <a:gd name="adj1" fmla="val 28404"/>
+            </a:avLst>
+          </a:prstGeom>
+          <a:ln>
+            <a:tailEnd type="triangle"/>
+          </a:ln>
+        </p:spPr>
+        <p:style>
+          <a:lnRef idx="1">
+            <a:schemeClr val="accent1"/>
+          </a:lnRef>
+          <a:fillRef idx="0">
+            <a:schemeClr val="accent1"/>
+          </a:fillRef>
+          <a:effectRef idx="0">
+            <a:schemeClr val="accent1"/>
+          </a:effectRef>
+          <a:fontRef idx="minor">
+            <a:schemeClr val="tx1"/>
+          </a:fontRef>
+        </p:style>
+      </p:cxnSp>
+      <p:cxnSp>
+        <p:nvCxnSpPr>
+          <p:cNvPr id="163" name="연결선: 꺾임 129">
+            <a:extLst>
+              <a:ext uri="{FF2B5EF4-FFF2-40B4-BE49-F238E27FC236}">
+                <a16:creationId xmlns:a16="http://schemas.microsoft.com/office/drawing/2014/main" id="{CCEA1E12-18DD-42AE-B2B3-00D0FA67F41E}"/>
+              </a:ext>
+            </a:extLst>
+          </p:cNvPr>
+          <p:cNvCxnSpPr>
+            <a:cxnSpLocks/>
+            <a:stCxn id="102" idx="2"/>
+            <a:endCxn id="143" idx="2"/>
+          </p:cNvCxnSpPr>
+          <p:nvPr/>
+        </p:nvCxnSpPr>
+        <p:spPr>
+          <a:xfrm rot="10800000">
+            <a:off x="5325198" y="2790205"/>
+            <a:ext cx="1331695" cy="1255295"/>
           </a:xfrm>
           <a:prstGeom prst="bentConnector2">
             <a:avLst/>
+          </a:prstGeom>
+          <a:ln>
+            <a:tailEnd type="triangle"/>
+          </a:ln>
+        </p:spPr>
+        <p:style>
+          <a:lnRef idx="1">
+            <a:schemeClr val="accent1"/>
+          </a:lnRef>
+          <a:fillRef idx="0">
+            <a:schemeClr val="accent1"/>
+          </a:fillRef>
+          <a:effectRef idx="0">
+            <a:schemeClr val="accent1"/>
+          </a:effectRef>
+          <a:fontRef idx="minor">
+            <a:schemeClr val="tx1"/>
+          </a:fontRef>
+        </p:style>
+      </p:cxnSp>
+      <p:cxnSp>
+        <p:nvCxnSpPr>
+          <p:cNvPr id="169" name="연결선: 꺾임 129">
+            <a:extLst>
+              <a:ext uri="{FF2B5EF4-FFF2-40B4-BE49-F238E27FC236}">
+                <a16:creationId xmlns:a16="http://schemas.microsoft.com/office/drawing/2014/main" id="{9DFA1C1F-33D7-4D3D-8A4F-D13480A9D09C}"/>
+              </a:ext>
+            </a:extLst>
+          </p:cNvPr>
+          <p:cNvCxnSpPr>
+            <a:cxnSpLocks/>
+            <a:stCxn id="146" idx="3"/>
+            <a:endCxn id="149" idx="1"/>
+          </p:cNvCxnSpPr>
+          <p:nvPr/>
+        </p:nvCxnSpPr>
+        <p:spPr>
+          <a:xfrm rot="5400000" flipH="1" flipV="1">
+            <a:off x="5190241" y="2351780"/>
+            <a:ext cx="118556" cy="1"/>
+          </a:xfrm>
+          <a:prstGeom prst="bentConnector3">
+            <a:avLst>
+              <a:gd name="adj1" fmla="val 50000"/>
+            </a:avLst>
+          </a:prstGeom>
+          <a:ln>
+            <a:tailEnd type="triangle"/>
+          </a:ln>
+        </p:spPr>
+        <p:style>
+          <a:lnRef idx="1">
+            <a:schemeClr val="accent1"/>
+          </a:lnRef>
+          <a:fillRef idx="0">
+            <a:schemeClr val="accent1"/>
+          </a:fillRef>
+          <a:effectRef idx="0">
+            <a:schemeClr val="accent1"/>
+          </a:effectRef>
+          <a:fontRef idx="minor">
+            <a:schemeClr val="tx1"/>
+          </a:fontRef>
+        </p:style>
+      </p:cxnSp>
+      <p:cxnSp>
+        <p:nvCxnSpPr>
+          <p:cNvPr id="170" name="연결선: 꺾임 169">
+            <a:extLst>
+              <a:ext uri="{FF2B5EF4-FFF2-40B4-BE49-F238E27FC236}">
+                <a16:creationId xmlns:a16="http://schemas.microsoft.com/office/drawing/2014/main" id="{F66C4DB4-0277-4542-ABE8-739205AAB113}"/>
+              </a:ext>
+            </a:extLst>
+          </p:cNvPr>
+          <p:cNvCxnSpPr>
+            <a:cxnSpLocks/>
+            <a:stCxn id="135" idx="0"/>
+            <a:endCxn id="153" idx="4"/>
+          </p:cNvCxnSpPr>
+          <p:nvPr/>
+        </p:nvCxnSpPr>
+        <p:spPr>
+          <a:xfrm rot="10800000" flipV="1">
+            <a:off x="5376586" y="1759734"/>
+            <a:ext cx="415797" cy="1468"/>
+          </a:xfrm>
+          <a:prstGeom prst="bentConnector3">
+            <a:avLst>
+              <a:gd name="adj1" fmla="val 50000"/>
+            </a:avLst>
+          </a:prstGeom>
+          <a:ln>
+            <a:tailEnd type="triangle"/>
+          </a:ln>
+        </p:spPr>
+        <p:style>
+          <a:lnRef idx="1">
+            <a:schemeClr val="accent1"/>
+          </a:lnRef>
+          <a:fillRef idx="0">
+            <a:schemeClr val="accent1"/>
+          </a:fillRef>
+          <a:effectRef idx="0">
+            <a:schemeClr val="accent1"/>
+          </a:effectRef>
+          <a:fontRef idx="minor">
+            <a:schemeClr val="tx1"/>
+          </a:fontRef>
+        </p:style>
+      </p:cxnSp>
+      <p:grpSp>
+        <p:nvGrpSpPr>
+          <p:cNvPr id="227" name="그룹 226">
+            <a:extLst>
+              <a:ext uri="{FF2B5EF4-FFF2-40B4-BE49-F238E27FC236}">
+                <a16:creationId xmlns:a16="http://schemas.microsoft.com/office/drawing/2014/main" id="{535B486C-C6CE-49CA-8FAB-FDB84F606645}"/>
+              </a:ext>
+            </a:extLst>
+          </p:cNvPr>
+          <p:cNvGrpSpPr/>
+          <p:nvPr/>
+        </p:nvGrpSpPr>
+        <p:grpSpPr>
+          <a:xfrm>
+            <a:off x="2759227" y="5679409"/>
+            <a:ext cx="1264080" cy="995925"/>
+            <a:chOff x="798286" y="740229"/>
+            <a:chExt cx="1378857" cy="1378857"/>
+          </a:xfrm>
+        </p:grpSpPr>
+        <p:sp>
+          <p:nvSpPr>
+            <p:cNvPr id="229" name="타원 228">
+              <a:extLst>
+                <a:ext uri="{FF2B5EF4-FFF2-40B4-BE49-F238E27FC236}">
+                  <a16:creationId xmlns:a16="http://schemas.microsoft.com/office/drawing/2014/main" id="{3997E59C-71A3-4E0C-8797-A3B711DCADFB}"/>
+                </a:ext>
+              </a:extLst>
+            </p:cNvPr>
+            <p:cNvSpPr/>
+            <p:nvPr/>
+          </p:nvSpPr>
+          <p:spPr>
+            <a:xfrm>
+              <a:off x="798286" y="740229"/>
+              <a:ext cx="1378857" cy="1378857"/>
+            </a:xfrm>
+            <a:prstGeom prst="ellipse">
+              <a:avLst/>
+            </a:prstGeom>
+            <a:noFill/>
+            <a:ln>
+              <a:solidFill>
+                <a:schemeClr val="tx1"/>
+              </a:solidFill>
+            </a:ln>
+          </p:spPr>
+          <p:style>
+            <a:lnRef idx="2">
+              <a:schemeClr val="accent1">
+                <a:shade val="50000"/>
+              </a:schemeClr>
+            </a:lnRef>
+            <a:fillRef idx="1">
+              <a:schemeClr val="accent1"/>
+            </a:fillRef>
+            <a:effectRef idx="0">
+              <a:schemeClr val="accent1"/>
+            </a:effectRef>
+            <a:fontRef idx="minor">
+              <a:schemeClr val="lt1"/>
+            </a:fontRef>
+          </p:style>
+          <p:txBody>
+            <a:bodyPr rtlCol="0" anchor="ctr"/>
+            <a:lstStyle/>
+            <a:p>
+              <a:pPr algn="ctr"/>
+              <a:endParaRPr lang="ko-KR" altLang="en-US" sz="900" dirty="0">
+                <a:solidFill>
+                  <a:schemeClr val="tx1"/>
+                </a:solidFill>
+              </a:endParaRPr>
+            </a:p>
+          </p:txBody>
+        </p:sp>
+        <p:sp>
+          <p:nvSpPr>
+            <p:cNvPr id="230" name="직사각형 229">
+              <a:extLst>
+                <a:ext uri="{FF2B5EF4-FFF2-40B4-BE49-F238E27FC236}">
+                  <a16:creationId xmlns:a16="http://schemas.microsoft.com/office/drawing/2014/main" id="{57C902B6-36E6-4971-BDE5-B2B45A9D7296}"/>
+                </a:ext>
+              </a:extLst>
+            </p:cNvPr>
+            <p:cNvSpPr/>
+            <p:nvPr/>
+          </p:nvSpPr>
+          <p:spPr>
+            <a:xfrm>
+              <a:off x="798286" y="740229"/>
+              <a:ext cx="1378857" cy="1378857"/>
+            </a:xfrm>
+            <a:prstGeom prst="rect">
+              <a:avLst/>
+            </a:prstGeom>
+            <a:noFill/>
+            <a:ln>
+              <a:noFill/>
+            </a:ln>
+          </p:spPr>
+          <p:style>
+            <a:lnRef idx="2">
+              <a:schemeClr val="accent1">
+                <a:shade val="50000"/>
+              </a:schemeClr>
+            </a:lnRef>
+            <a:fillRef idx="1">
+              <a:schemeClr val="accent1"/>
+            </a:fillRef>
+            <a:effectRef idx="0">
+              <a:schemeClr val="accent1"/>
+            </a:effectRef>
+            <a:fontRef idx="minor">
+              <a:schemeClr val="lt1"/>
+            </a:fontRef>
+          </p:style>
+          <p:txBody>
+            <a:bodyPr rtlCol="0" anchor="ctr"/>
+            <a:lstStyle/>
+            <a:p>
+              <a:pPr algn="ctr"/>
+              <a:r>
+                <a:rPr lang="en-US" altLang="ko-KR" sz="900" dirty="0">
+                  <a:solidFill>
+                    <a:schemeClr val="tx1"/>
+                  </a:solidFill>
+                </a:rPr>
+                <a:t>FSM</a:t>
+              </a:r>
+              <a:endParaRPr lang="ko-KR" altLang="en-US" sz="900" dirty="0">
+                <a:solidFill>
+                  <a:schemeClr val="tx1"/>
+                </a:solidFill>
+              </a:endParaRPr>
+            </a:p>
+          </p:txBody>
+        </p:sp>
+      </p:grpSp>
+      <p:cxnSp>
+        <p:nvCxnSpPr>
+          <p:cNvPr id="245" name="연결선: 꺾임 129">
+            <a:extLst>
+              <a:ext uri="{FF2B5EF4-FFF2-40B4-BE49-F238E27FC236}">
+                <a16:creationId xmlns:a16="http://schemas.microsoft.com/office/drawing/2014/main" id="{CC704495-3523-4EF2-85C3-6386ED8FD34F}"/>
+              </a:ext>
+            </a:extLst>
+          </p:cNvPr>
+          <p:cNvCxnSpPr>
+            <a:cxnSpLocks/>
+            <a:stCxn id="229" idx="3"/>
+            <a:endCxn id="250" idx="1"/>
+          </p:cNvCxnSpPr>
+          <p:nvPr/>
+        </p:nvCxnSpPr>
+        <p:spPr>
+          <a:xfrm rot="5400000" flipH="1" flipV="1">
+            <a:off x="2277159" y="5553020"/>
+            <a:ext cx="1643652" cy="309276"/>
+          </a:xfrm>
+          <a:prstGeom prst="bentConnector4">
+            <a:avLst>
+              <a:gd name="adj1" fmla="val -8410"/>
+              <a:gd name="adj2" fmla="val -207685"/>
+            </a:avLst>
+          </a:prstGeom>
+          <a:ln>
+            <a:tailEnd type="triangle"/>
+          </a:ln>
+        </p:spPr>
+        <p:style>
+          <a:lnRef idx="1">
+            <a:schemeClr val="accent1"/>
+          </a:lnRef>
+          <a:fillRef idx="0">
+            <a:schemeClr val="accent1"/>
+          </a:fillRef>
+          <a:effectRef idx="0">
+            <a:schemeClr val="accent1"/>
+          </a:effectRef>
+          <a:fontRef idx="minor">
+            <a:schemeClr val="tx1"/>
+          </a:fontRef>
+        </p:style>
+      </p:cxnSp>
+      <p:grpSp>
+        <p:nvGrpSpPr>
+          <p:cNvPr id="247" name="그룹 246">
+            <a:extLst>
+              <a:ext uri="{FF2B5EF4-FFF2-40B4-BE49-F238E27FC236}">
+                <a16:creationId xmlns:a16="http://schemas.microsoft.com/office/drawing/2014/main" id="{0AC05383-B6DB-49F3-9628-6EBA08AA7C51}"/>
+              </a:ext>
+            </a:extLst>
+          </p:cNvPr>
+          <p:cNvGrpSpPr/>
+          <p:nvPr/>
+        </p:nvGrpSpPr>
+        <p:grpSpPr>
+          <a:xfrm>
+            <a:off x="3202665" y="4758200"/>
+            <a:ext cx="698500" cy="255263"/>
+            <a:chOff x="3601793" y="3387725"/>
+            <a:chExt cx="698500" cy="255263"/>
+          </a:xfrm>
+        </p:grpSpPr>
+        <p:sp>
+          <p:nvSpPr>
+            <p:cNvPr id="250" name="사다리꼴 249">
+              <a:extLst>
+                <a:ext uri="{FF2B5EF4-FFF2-40B4-BE49-F238E27FC236}">
+                  <a16:creationId xmlns:a16="http://schemas.microsoft.com/office/drawing/2014/main" id="{D1D4D9AA-B2A0-4032-89F4-96EB350C457A}"/>
+                </a:ext>
+              </a:extLst>
+            </p:cNvPr>
+            <p:cNvSpPr/>
+            <p:nvPr/>
+          </p:nvSpPr>
+          <p:spPr>
+            <a:xfrm>
+              <a:off x="3601793" y="3387725"/>
+              <a:ext cx="698500" cy="255263"/>
+            </a:xfrm>
+            <a:prstGeom prst="trapezoid">
+              <a:avLst>
+                <a:gd name="adj" fmla="val 39926"/>
+              </a:avLst>
+            </a:prstGeom>
+          </p:spPr>
+          <p:style>
+            <a:lnRef idx="2">
+              <a:schemeClr val="accent1">
+                <a:shade val="50000"/>
+              </a:schemeClr>
+            </a:lnRef>
+            <a:fillRef idx="1">
+              <a:schemeClr val="accent1"/>
+            </a:fillRef>
+            <a:effectRef idx="0">
+              <a:schemeClr val="accent1"/>
+            </a:effectRef>
+            <a:fontRef idx="minor">
+              <a:schemeClr val="lt1"/>
+            </a:fontRef>
+          </p:style>
+          <p:txBody>
+            <a:bodyPr rtlCol="0" anchor="ctr"/>
+            <a:lstStyle/>
+            <a:p>
+              <a:pPr algn="ctr"/>
+              <a:r>
+                <a:rPr lang="en-US" altLang="ko-KR" sz="900" dirty="0"/>
+                <a:t>0      1</a:t>
+              </a:r>
+              <a:endParaRPr lang="ko-KR" altLang="en-US" sz="900" dirty="0"/>
+            </a:p>
+          </p:txBody>
+        </p:sp>
+        <p:sp>
+          <p:nvSpPr>
+            <p:cNvPr id="251" name="타원 250">
+              <a:extLst>
+                <a:ext uri="{FF2B5EF4-FFF2-40B4-BE49-F238E27FC236}">
+                  <a16:creationId xmlns:a16="http://schemas.microsoft.com/office/drawing/2014/main" id="{D2651E16-A6A0-43B6-AB19-96D95CC43B06}"/>
+                </a:ext>
+              </a:extLst>
+            </p:cNvPr>
+            <p:cNvSpPr/>
+            <p:nvPr/>
+          </p:nvSpPr>
+          <p:spPr>
+            <a:xfrm>
+              <a:off x="4167133" y="3575844"/>
+              <a:ext cx="66577" cy="66577"/>
+            </a:xfrm>
+            <a:prstGeom prst="ellipse">
+              <a:avLst/>
+            </a:prstGeom>
+          </p:spPr>
+          <p:style>
+            <a:lnRef idx="2">
+              <a:schemeClr val="accent1">
+                <a:shade val="50000"/>
+              </a:schemeClr>
+            </a:lnRef>
+            <a:fillRef idx="1">
+              <a:schemeClr val="accent1"/>
+            </a:fillRef>
+            <a:effectRef idx="0">
+              <a:schemeClr val="accent1"/>
+            </a:effectRef>
+            <a:fontRef idx="minor">
+              <a:schemeClr val="lt1"/>
+            </a:fontRef>
+          </p:style>
+          <p:txBody>
+            <a:bodyPr rtlCol="0" anchor="ctr"/>
+            <a:lstStyle/>
+            <a:p>
+              <a:pPr algn="ctr"/>
+              <a:endParaRPr lang="ko-KR" altLang="en-US" sz="1100" dirty="0"/>
+            </a:p>
+          </p:txBody>
+        </p:sp>
+        <p:sp>
+          <p:nvSpPr>
+            <p:cNvPr id="259" name="타원 258">
+              <a:extLst>
+                <a:ext uri="{FF2B5EF4-FFF2-40B4-BE49-F238E27FC236}">
+                  <a16:creationId xmlns:a16="http://schemas.microsoft.com/office/drawing/2014/main" id="{0DFB7CB4-A020-4122-B99C-E6E458266315}"/>
+                </a:ext>
+              </a:extLst>
+            </p:cNvPr>
+            <p:cNvSpPr/>
+            <p:nvPr/>
+          </p:nvSpPr>
+          <p:spPr>
+            <a:xfrm>
+              <a:off x="3663563" y="3575844"/>
+              <a:ext cx="66577" cy="66577"/>
+            </a:xfrm>
+            <a:prstGeom prst="ellipse">
+              <a:avLst/>
+            </a:prstGeom>
+          </p:spPr>
+          <p:style>
+            <a:lnRef idx="2">
+              <a:schemeClr val="accent1">
+                <a:shade val="50000"/>
+              </a:schemeClr>
+            </a:lnRef>
+            <a:fillRef idx="1">
+              <a:schemeClr val="accent1"/>
+            </a:fillRef>
+            <a:effectRef idx="0">
+              <a:schemeClr val="accent1"/>
+            </a:effectRef>
+            <a:fontRef idx="minor">
+              <a:schemeClr val="lt1"/>
+            </a:fontRef>
+          </p:style>
+          <p:txBody>
+            <a:bodyPr rtlCol="0" anchor="ctr"/>
+            <a:lstStyle/>
+            <a:p>
+              <a:pPr algn="ctr"/>
+              <a:endParaRPr lang="ko-KR" altLang="en-US" sz="1100" dirty="0"/>
+            </a:p>
+          </p:txBody>
+        </p:sp>
+      </p:grpSp>
+      <p:cxnSp>
+        <p:nvCxnSpPr>
+          <p:cNvPr id="260" name="연결선: 꺾임 129">
+            <a:extLst>
+              <a:ext uri="{FF2B5EF4-FFF2-40B4-BE49-F238E27FC236}">
+                <a16:creationId xmlns:a16="http://schemas.microsoft.com/office/drawing/2014/main" id="{D03AEE62-4CED-4441-8ABE-61F6552E0BC9}"/>
+              </a:ext>
+            </a:extLst>
+          </p:cNvPr>
+          <p:cNvCxnSpPr>
+            <a:cxnSpLocks/>
+            <a:stCxn id="250" idx="0"/>
+            <a:endCxn id="151" idx="4"/>
+          </p:cNvCxnSpPr>
+          <p:nvPr/>
+        </p:nvCxnSpPr>
+        <p:spPr>
+          <a:xfrm rot="5400000" flipH="1" flipV="1">
+            <a:off x="3542017" y="4603366"/>
+            <a:ext cx="164733" cy="144937"/>
+          </a:xfrm>
+          <a:prstGeom prst="bentConnector3">
+            <a:avLst>
+              <a:gd name="adj1" fmla="val 50000"/>
+            </a:avLst>
           </a:prstGeom>
           <a:ln>
             <a:tailEnd type="triangle"/>

</xml_diff>